<commit_message>
CHange default font to Arial
</commit_message>
<xml_diff>
--- a/lectures3/Pythonlearn-07-Files.pptx
+++ b/lectures3/Pythonlearn-07-Files.pptx
@@ -585,8 +585,8 @@
         </p:nvSpPr>
         <p:spPr>
           <a:xfrm>
-            <a:off x="1143225" y="685800"/>
-            <a:ext cx="4572225" cy="3429000"/>
+            <a:off x="381000" y="685800"/>
+            <a:ext cx="6096000" cy="3429000"/>
           </a:xfrm>
           <a:custGeom>
             <a:avLst/>
@@ -695,8 +695,8 @@
         </p:nvSpPr>
         <p:spPr>
           <a:xfrm>
-            <a:off x="1143225" y="685800"/>
-            <a:ext cx="4572225" cy="3429000"/>
+            <a:off x="381000" y="685800"/>
+            <a:ext cx="6096000" cy="3429000"/>
           </a:xfrm>
           <a:custGeom>
             <a:avLst/>
@@ -805,8 +805,8 @@
         </p:nvSpPr>
         <p:spPr>
           <a:xfrm>
-            <a:off x="1143225" y="685800"/>
-            <a:ext cx="4572225" cy="3429000"/>
+            <a:off x="381000" y="685800"/>
+            <a:ext cx="6096000" cy="3429000"/>
           </a:xfrm>
           <a:custGeom>
             <a:avLst/>
@@ -915,8 +915,8 @@
         </p:nvSpPr>
         <p:spPr>
           <a:xfrm>
-            <a:off x="1143225" y="685800"/>
-            <a:ext cx="4572225" cy="3429000"/>
+            <a:off x="381000" y="685800"/>
+            <a:ext cx="6096000" cy="3429000"/>
           </a:xfrm>
           <a:custGeom>
             <a:avLst/>
@@ -1025,8 +1025,8 @@
         </p:nvSpPr>
         <p:spPr>
           <a:xfrm>
-            <a:off x="1143225" y="685800"/>
-            <a:ext cx="4572225" cy="3429000"/>
+            <a:off x="381000" y="685800"/>
+            <a:ext cx="6096000" cy="3429000"/>
           </a:xfrm>
           <a:custGeom>
             <a:avLst/>
@@ -1135,8 +1135,8 @@
         </p:nvSpPr>
         <p:spPr>
           <a:xfrm>
-            <a:off x="1143225" y="685800"/>
-            <a:ext cx="4572225" cy="3429000"/>
+            <a:off x="381000" y="685800"/>
+            <a:ext cx="6096000" cy="3429000"/>
           </a:xfrm>
           <a:custGeom>
             <a:avLst/>
@@ -1245,8 +1245,8 @@
         </p:nvSpPr>
         <p:spPr>
           <a:xfrm>
-            <a:off x="1143225" y="685800"/>
-            <a:ext cx="4572225" cy="3429000"/>
+            <a:off x="381000" y="685800"/>
+            <a:ext cx="6096000" cy="3429000"/>
           </a:xfrm>
           <a:custGeom>
             <a:avLst/>
@@ -1355,8 +1355,8 @@
         </p:nvSpPr>
         <p:spPr>
           <a:xfrm>
-            <a:off x="1143225" y="685800"/>
-            <a:ext cx="4572225" cy="3429000"/>
+            <a:off x="381000" y="685800"/>
+            <a:ext cx="6096000" cy="3429000"/>
           </a:xfrm>
           <a:custGeom>
             <a:avLst/>
@@ -1465,8 +1465,8 @@
         </p:nvSpPr>
         <p:spPr>
           <a:xfrm>
-            <a:off x="1143225" y="685800"/>
-            <a:ext cx="4572225" cy="3429000"/>
+            <a:off x="381000" y="685800"/>
+            <a:ext cx="6096000" cy="3429000"/>
           </a:xfrm>
           <a:custGeom>
             <a:avLst/>
@@ -1575,8 +1575,8 @@
         </p:nvSpPr>
         <p:spPr>
           <a:xfrm>
-            <a:off x="1143225" y="685800"/>
-            <a:ext cx="4572225" cy="3429000"/>
+            <a:off x="381000" y="685800"/>
+            <a:ext cx="6096000" cy="3429000"/>
           </a:xfrm>
           <a:custGeom>
             <a:avLst/>
@@ -1685,8 +1685,8 @@
         </p:nvSpPr>
         <p:spPr>
           <a:xfrm>
-            <a:off x="1143225" y="685800"/>
-            <a:ext cx="4572225" cy="3429000"/>
+            <a:off x="381000" y="685800"/>
+            <a:ext cx="6096000" cy="3429000"/>
           </a:xfrm>
           <a:custGeom>
             <a:avLst/>
@@ -1795,8 +1795,8 @@
         </p:nvSpPr>
         <p:spPr>
           <a:xfrm>
-            <a:off x="1143225" y="685800"/>
-            <a:ext cx="4572225" cy="3429000"/>
+            <a:off x="381000" y="685800"/>
+            <a:ext cx="6096000" cy="3429000"/>
           </a:xfrm>
           <a:custGeom>
             <a:avLst/>
@@ -1905,8 +1905,8 @@
         </p:nvSpPr>
         <p:spPr>
           <a:xfrm>
-            <a:off x="1143225" y="685800"/>
-            <a:ext cx="4572225" cy="3429000"/>
+            <a:off x="381000" y="685800"/>
+            <a:ext cx="6096000" cy="3429000"/>
           </a:xfrm>
           <a:custGeom>
             <a:avLst/>
@@ -2015,8 +2015,8 @@
         </p:nvSpPr>
         <p:spPr>
           <a:xfrm>
-            <a:off x="1143225" y="685800"/>
-            <a:ext cx="4572225" cy="3429000"/>
+            <a:off x="381000" y="685800"/>
+            <a:ext cx="6096000" cy="3429000"/>
           </a:xfrm>
           <a:custGeom>
             <a:avLst/>
@@ -2125,8 +2125,8 @@
         </p:nvSpPr>
         <p:spPr>
           <a:xfrm>
-            <a:off x="1143225" y="685800"/>
-            <a:ext cx="4572225" cy="3429000"/>
+            <a:off x="381000" y="685800"/>
+            <a:ext cx="6096000" cy="3429000"/>
           </a:xfrm>
           <a:custGeom>
             <a:avLst/>
@@ -2345,8 +2345,8 @@
         </p:nvSpPr>
         <p:spPr>
           <a:xfrm>
-            <a:off x="1143225" y="685800"/>
-            <a:ext cx="4572225" cy="3429000"/>
+            <a:off x="381000" y="685800"/>
+            <a:ext cx="6096000" cy="3429000"/>
           </a:xfrm>
           <a:custGeom>
             <a:avLst/>
@@ -2455,8 +2455,8 @@
         </p:nvSpPr>
         <p:spPr>
           <a:xfrm>
-            <a:off x="1143225" y="685800"/>
-            <a:ext cx="4572225" cy="3429000"/>
+            <a:off x="381000" y="685800"/>
+            <a:ext cx="6096000" cy="3429000"/>
           </a:xfrm>
           <a:custGeom>
             <a:avLst/>
@@ -2565,8 +2565,8 @@
         </p:nvSpPr>
         <p:spPr>
           <a:xfrm>
-            <a:off x="1143225" y="685800"/>
-            <a:ext cx="4572225" cy="3429000"/>
+            <a:off x="381000" y="685800"/>
+            <a:ext cx="6096000" cy="3429000"/>
           </a:xfrm>
           <a:custGeom>
             <a:avLst/>
@@ -2675,8 +2675,8 @@
         </p:nvSpPr>
         <p:spPr>
           <a:xfrm>
-            <a:off x="1143225" y="685800"/>
-            <a:ext cx="4572225" cy="3429000"/>
+            <a:off x="381000" y="685800"/>
+            <a:ext cx="6096000" cy="3429000"/>
           </a:xfrm>
           <a:custGeom>
             <a:avLst/>
@@ -2785,8 +2785,8 @@
         </p:nvSpPr>
         <p:spPr>
           <a:xfrm>
-            <a:off x="1143225" y="685800"/>
-            <a:ext cx="4572225" cy="3429000"/>
+            <a:off x="381000" y="685800"/>
+            <a:ext cx="6096000" cy="3429000"/>
           </a:xfrm>
           <a:custGeom>
             <a:avLst/>
@@ -2895,8 +2895,8 @@
         </p:nvSpPr>
         <p:spPr>
           <a:xfrm>
-            <a:off x="1143225" y="685800"/>
-            <a:ext cx="4572225" cy="3429000"/>
+            <a:off x="381000" y="685800"/>
+            <a:ext cx="6096000" cy="3429000"/>
           </a:xfrm>
           <a:custGeom>
             <a:avLst/>
@@ -3005,8 +3005,8 @@
         </p:nvSpPr>
         <p:spPr>
           <a:xfrm>
-            <a:off x="1143225" y="685800"/>
-            <a:ext cx="4572225" cy="3429000"/>
+            <a:off x="381000" y="685800"/>
+            <a:ext cx="6096000" cy="3429000"/>
           </a:xfrm>
           <a:custGeom>
             <a:avLst/>
@@ -20933,13 +20933,13 @@
               <a:buNone/>
             </a:pPr>
             <a:r>
-              <a:rPr lang="en-US" sz="7600" b="0" i="0" u="none" strike="noStrike" cap="none">
+              <a:rPr lang="en-US" sz="7600" u="none" strike="noStrike" cap="none">
                 <a:solidFill>
                   <a:srgbClr val="FFFF00"/>
                 </a:solidFill>
-                <a:latin typeface="Cabin"/>
-                <a:ea typeface="Cabin"/>
-                <a:cs typeface="Cabin"/>
+                <a:latin typeface="Arial" charset="0"/>
+                <a:ea typeface="Arial" charset="0"/>
+                <a:cs typeface="Arial" charset="0"/>
                 <a:sym typeface="Cabin"/>
               </a:rPr>
               <a:t>Reading Files</a:t>
@@ -20994,13 +20994,13 @@
               <a:buNone/>
             </a:pPr>
             <a:r>
-              <a:rPr lang="en-US" sz="4800" b="0" i="0" u="none" strike="noStrike" cap="none">
+              <a:rPr lang="en-US" sz="4800" u="none" strike="noStrike" cap="none">
                 <a:solidFill>
                   <a:schemeClr val="lt1"/>
                 </a:solidFill>
-                <a:latin typeface="Cabin"/>
-                <a:ea typeface="Cabin"/>
-                <a:cs typeface="Cabin"/>
+                <a:latin typeface="Arial" charset="0"/>
+                <a:ea typeface="Arial" charset="0"/>
+                <a:cs typeface="Arial" charset="0"/>
                 <a:sym typeface="Cabin"/>
               </a:rPr>
               <a:t>Chapter 7</a:t>
@@ -21051,13 +21051,13 @@
               <a:buNone/>
             </a:pPr>
             <a:r>
-              <a:rPr lang="en-US" sz="3200" b="0" i="0" u="none" strike="noStrike" cap="none">
+              <a:rPr lang="en-US" sz="3200" u="none" strike="noStrike" cap="none">
                 <a:solidFill>
                   <a:srgbClr val="FFFF00"/>
                 </a:solidFill>
-                <a:latin typeface="Cabin"/>
-                <a:ea typeface="Cabin"/>
-                <a:cs typeface="Cabin"/>
+                <a:latin typeface="Arial" charset="0"/>
+                <a:ea typeface="Arial" charset="0"/>
+                <a:cs typeface="Arial" charset="0"/>
                 <a:sym typeface="Cabin"/>
               </a:rPr>
               <a:t>Python for Informatics: Exploring Information</a:t>
@@ -21082,13 +21082,13 @@
               <a:buNone/>
             </a:pPr>
             <a:r>
-              <a:rPr lang="en-US" sz="3200" b="0" i="0" u="sng" strike="noStrike" cap="none">
+              <a:rPr lang="en-US" sz="3200" u="sng" strike="noStrike" cap="none">
                 <a:solidFill>
                   <a:srgbClr val="FFFF00"/>
                 </a:solidFill>
-                <a:latin typeface="Cabin"/>
-                <a:ea typeface="Cabin"/>
-                <a:cs typeface="Cabin"/>
+                <a:latin typeface="Arial" charset="0"/>
+                <a:ea typeface="Arial" charset="0"/>
+                <a:cs typeface="Arial" charset="0"/>
                 <a:sym typeface="Cabin"/>
                 <a:hlinkClick r:id="rId3"/>
               </a:rPr>
@@ -21223,13 +21223,13 @@
               <a:buNone/>
             </a:pPr>
             <a:r>
-              <a:rPr lang="en-US" sz="7600" b="0" i="0" u="none" strike="noStrike" cap="none">
+              <a:rPr lang="en-US" sz="7600" u="none" strike="noStrike" cap="none">
                 <a:solidFill>
                   <a:srgbClr val="FFFF00"/>
                 </a:solidFill>
-                <a:latin typeface="Cabin"/>
-                <a:ea typeface="Cabin"/>
-                <a:cs typeface="Cabin"/>
+                <a:latin typeface="Arial" charset="0"/>
+                <a:ea typeface="Arial" charset="0"/>
+                <a:cs typeface="Arial" charset="0"/>
                 <a:sym typeface="Cabin"/>
               </a:rPr>
               <a:t>File Processing</a:t>
@@ -21284,37 +21284,37 @@
               <a:buChar char="•"/>
             </a:pPr>
             <a:r>
-              <a:rPr lang="en-US" sz="3600" b="0" i="0" u="none" strike="noStrike" cap="none">
+              <a:rPr lang="en-US" sz="3600" u="none" strike="noStrike" cap="none">
                 <a:solidFill>
                   <a:schemeClr val="lt1"/>
                 </a:solidFill>
-                <a:latin typeface="Cabin"/>
-                <a:ea typeface="Cabin"/>
-                <a:cs typeface="Cabin"/>
+                <a:latin typeface="Arial" charset="0"/>
+                <a:ea typeface="Arial" charset="0"/>
+                <a:cs typeface="Arial" charset="0"/>
                 <a:sym typeface="Cabin"/>
               </a:rPr>
               <a:t>A text file has </a:t>
             </a:r>
             <a:r>
-              <a:rPr lang="en-US" sz="3600" b="0" i="0" u="none" strike="noStrike" cap="none">
+              <a:rPr lang="en-US" sz="3600" u="none" strike="noStrike" cap="none">
                 <a:solidFill>
                   <a:srgbClr val="00FFFF"/>
                 </a:solidFill>
-                <a:latin typeface="Cabin"/>
-                <a:ea typeface="Cabin"/>
-                <a:cs typeface="Cabin"/>
+                <a:latin typeface="Arial" charset="0"/>
+                <a:ea typeface="Arial" charset="0"/>
+                <a:cs typeface="Arial" charset="0"/>
                 <a:sym typeface="Cabin"/>
               </a:rPr>
               <a:t>newlines</a:t>
             </a:r>
             <a:r>
-              <a:rPr lang="en-US" sz="3600" b="0" i="0" u="none" strike="noStrike" cap="none">
+              <a:rPr lang="en-US" sz="3600" u="none" strike="noStrike" cap="none">
                 <a:solidFill>
                   <a:schemeClr val="lt1"/>
                 </a:solidFill>
-                <a:latin typeface="Cabin"/>
-                <a:ea typeface="Cabin"/>
-                <a:cs typeface="Cabin"/>
+                <a:latin typeface="Arial" charset="0"/>
+                <a:ea typeface="Arial" charset="0"/>
+                <a:cs typeface="Arial" charset="0"/>
                 <a:sym typeface="Cabin"/>
               </a:rPr>
               <a:t> at the end of each line</a:t>
@@ -21800,13 +21800,13 @@
               <a:buNone/>
             </a:pPr>
             <a:r>
-              <a:rPr lang="en-US" sz="7600" b="0" i="0" u="none" strike="noStrike" cap="none">
+              <a:rPr lang="en-US" sz="7600" u="none" strike="noStrike" cap="none">
                 <a:solidFill>
                   <a:srgbClr val="FFFF00"/>
                 </a:solidFill>
-                <a:latin typeface="Cabin"/>
-                <a:ea typeface="Cabin"/>
-                <a:cs typeface="Cabin"/>
+                <a:latin typeface="Arial" charset="0"/>
+                <a:ea typeface="Arial" charset="0"/>
+                <a:cs typeface="Arial" charset="0"/>
                 <a:sym typeface="Cabin"/>
               </a:rPr>
               <a:t>File Handle as a Sequence</a:t>
@@ -21861,61 +21861,61 @@
               <a:buChar char="•"/>
             </a:pPr>
             <a:r>
-              <a:rPr lang="en-US" sz="3400" b="0" i="0" u="none" strike="noStrike" cap="none">
+              <a:rPr lang="en-US" sz="3400" u="none" strike="noStrike" cap="none">
                 <a:solidFill>
                   <a:schemeClr val="lt1"/>
                 </a:solidFill>
-                <a:latin typeface="Cabin"/>
-                <a:ea typeface="Cabin"/>
-                <a:cs typeface="Cabin"/>
+                <a:latin typeface="Arial" charset="0"/>
+                <a:ea typeface="Arial" charset="0"/>
+                <a:cs typeface="Arial" charset="0"/>
                 <a:sym typeface="Cabin"/>
               </a:rPr>
               <a:t>A </a:t>
             </a:r>
             <a:r>
-              <a:rPr lang="en-US" sz="3400" b="0" i="0" u="none" strike="noStrike" cap="none">
+              <a:rPr lang="en-US" sz="3400" u="none" strike="noStrike" cap="none">
                 <a:solidFill>
                   <a:srgbClr val="FF7F00"/>
                 </a:solidFill>
-                <a:latin typeface="Cabin"/>
-                <a:ea typeface="Cabin"/>
-                <a:cs typeface="Cabin"/>
+                <a:latin typeface="Arial" charset="0"/>
+                <a:ea typeface="Arial" charset="0"/>
+                <a:cs typeface="Arial" charset="0"/>
                 <a:sym typeface="Cabin"/>
               </a:rPr>
               <a:t>file handle</a:t>
             </a:r>
             <a:r>
-              <a:rPr lang="en-US" sz="3400" b="0" i="0" u="none" strike="noStrike" cap="none">
+              <a:rPr lang="en-US" sz="3400" u="none" strike="noStrike" cap="none">
                 <a:solidFill>
                   <a:schemeClr val="lt1"/>
                 </a:solidFill>
-                <a:latin typeface="Cabin"/>
-                <a:ea typeface="Cabin"/>
-                <a:cs typeface="Cabin"/>
+                <a:latin typeface="Arial" charset="0"/>
+                <a:ea typeface="Arial" charset="0"/>
+                <a:cs typeface="Arial" charset="0"/>
                 <a:sym typeface="Cabin"/>
               </a:rPr>
               <a:t> open for read can be treated as a </a:t>
             </a:r>
             <a:r>
-              <a:rPr lang="en-US" sz="3400" b="0" i="0" u="none" strike="noStrike" cap="none">
+              <a:rPr lang="en-US" sz="3400" u="none" strike="noStrike" cap="none">
                 <a:solidFill>
                   <a:srgbClr val="00FFFF"/>
                 </a:solidFill>
-                <a:latin typeface="Cabin"/>
-                <a:ea typeface="Cabin"/>
-                <a:cs typeface="Cabin"/>
+                <a:latin typeface="Arial" charset="0"/>
+                <a:ea typeface="Arial" charset="0"/>
+                <a:cs typeface="Arial" charset="0"/>
                 <a:sym typeface="Cabin"/>
               </a:rPr>
               <a:t>sequence</a:t>
             </a:r>
             <a:r>
-              <a:rPr lang="en-US" sz="3400" b="0" i="0" u="none" strike="noStrike" cap="none">
+              <a:rPr lang="en-US" sz="3400" u="none" strike="noStrike" cap="none">
                 <a:solidFill>
                   <a:schemeClr val="lt1"/>
                 </a:solidFill>
-                <a:latin typeface="Cabin"/>
-                <a:ea typeface="Cabin"/>
-                <a:cs typeface="Cabin"/>
+                <a:latin typeface="Arial" charset="0"/>
+                <a:ea typeface="Arial" charset="0"/>
+                <a:cs typeface="Arial" charset="0"/>
                 <a:sym typeface="Cabin"/>
               </a:rPr>
               <a:t> of strings where each line in the file is a string in the sequence</a:t>
@@ -21940,61 +21940,61 @@
               <a:buChar char="•"/>
             </a:pPr>
             <a:r>
-              <a:rPr lang="en-US" sz="3400" b="0" i="0" u="none" strike="noStrike" cap="none">
+              <a:rPr lang="en-US" sz="3400" u="none" strike="noStrike" cap="none">
                 <a:solidFill>
                   <a:schemeClr val="lt1"/>
                 </a:solidFill>
-                <a:latin typeface="Cabin"/>
-                <a:ea typeface="Cabin"/>
-                <a:cs typeface="Cabin"/>
+                <a:latin typeface="Arial" charset="0"/>
+                <a:ea typeface="Arial" charset="0"/>
+                <a:cs typeface="Arial" charset="0"/>
                 <a:sym typeface="Cabin"/>
               </a:rPr>
               <a:t>We can use the </a:t>
             </a:r>
             <a:r>
-              <a:rPr lang="en-US" sz="3400" b="0" i="0" u="none" strike="noStrike" cap="none">
+              <a:rPr lang="en-US" sz="3400" u="none" strike="noStrike" cap="none">
                 <a:solidFill>
                   <a:srgbClr val="FFFF00"/>
                 </a:solidFill>
-                <a:latin typeface="Cabin"/>
-                <a:ea typeface="Cabin"/>
-                <a:cs typeface="Cabin"/>
+                <a:latin typeface="Arial" charset="0"/>
+                <a:ea typeface="Arial" charset="0"/>
+                <a:cs typeface="Arial" charset="0"/>
                 <a:sym typeface="Cabin"/>
               </a:rPr>
               <a:t>for</a:t>
             </a:r>
             <a:r>
-              <a:rPr lang="en-US" sz="3400" b="0" i="0" u="none" strike="noStrike" cap="none">
+              <a:rPr lang="en-US" sz="3400" u="none" strike="noStrike" cap="none">
                 <a:solidFill>
                   <a:srgbClr val="00FF00"/>
                 </a:solidFill>
-                <a:latin typeface="Cabin"/>
-                <a:ea typeface="Cabin"/>
-                <a:cs typeface="Cabin"/>
+                <a:latin typeface="Arial" charset="0"/>
+                <a:ea typeface="Arial" charset="0"/>
+                <a:cs typeface="Arial" charset="0"/>
                 <a:sym typeface="Cabin"/>
               </a:rPr>
               <a:t> </a:t>
             </a:r>
             <a:r>
-              <a:rPr lang="en-US" sz="3400" b="0" i="0" u="none" strike="noStrike" cap="none">
+              <a:rPr lang="en-US" sz="3400" u="none" strike="noStrike" cap="none">
                 <a:solidFill>
                   <a:schemeClr val="lt1"/>
                 </a:solidFill>
-                <a:latin typeface="Cabin"/>
-                <a:ea typeface="Cabin"/>
-                <a:cs typeface="Cabin"/>
+                <a:latin typeface="Arial" charset="0"/>
+                <a:ea typeface="Arial" charset="0"/>
+                <a:cs typeface="Arial" charset="0"/>
                 <a:sym typeface="Cabin"/>
               </a:rPr>
               <a:t>statement to iterate through a </a:t>
             </a:r>
             <a:r>
-              <a:rPr lang="en-US" sz="3400" b="0" i="0" u="none" strike="noStrike" cap="none">
+              <a:rPr lang="en-US" sz="3400" u="none" strike="noStrike" cap="none">
                 <a:solidFill>
                   <a:srgbClr val="00FFFF"/>
                 </a:solidFill>
-                <a:latin typeface="Cabin"/>
-                <a:ea typeface="Cabin"/>
-                <a:cs typeface="Cabin"/>
+                <a:latin typeface="Arial" charset="0"/>
+                <a:ea typeface="Arial" charset="0"/>
+                <a:cs typeface="Arial" charset="0"/>
                 <a:sym typeface="Cabin"/>
               </a:rPr>
               <a:t>sequence</a:t>
@@ -22019,37 +22019,37 @@
               <a:buChar char="•"/>
             </a:pPr>
             <a:r>
-              <a:rPr lang="en-US" sz="3400" b="0" i="0" u="none" strike="noStrike" cap="none">
+              <a:rPr lang="en-US" sz="3400" u="none" strike="noStrike" cap="none">
                 <a:solidFill>
                   <a:schemeClr val="lt1"/>
                 </a:solidFill>
-                <a:latin typeface="Cabin"/>
-                <a:ea typeface="Cabin"/>
-                <a:cs typeface="Cabin"/>
+                <a:latin typeface="Arial" charset="0"/>
+                <a:ea typeface="Arial" charset="0"/>
+                <a:cs typeface="Arial" charset="0"/>
                 <a:sym typeface="Cabin"/>
               </a:rPr>
               <a:t>Remember - a </a:t>
             </a:r>
             <a:r>
-              <a:rPr lang="en-US" sz="3400" b="0" i="0" u="none" strike="noStrike" cap="none">
+              <a:rPr lang="en-US" sz="3400" u="none" strike="noStrike" cap="none">
                 <a:solidFill>
                   <a:srgbClr val="00FFFF"/>
                 </a:solidFill>
-                <a:latin typeface="Cabin"/>
-                <a:ea typeface="Cabin"/>
-                <a:cs typeface="Cabin"/>
+                <a:latin typeface="Arial" charset="0"/>
+                <a:ea typeface="Arial" charset="0"/>
+                <a:cs typeface="Arial" charset="0"/>
                 <a:sym typeface="Cabin"/>
               </a:rPr>
               <a:t>sequence</a:t>
             </a:r>
             <a:r>
-              <a:rPr lang="en-US" sz="3400" b="0" i="0" u="none" strike="noStrike" cap="none">
+              <a:rPr lang="en-US" sz="3400" u="none" strike="noStrike" cap="none">
                 <a:solidFill>
                   <a:schemeClr val="lt1"/>
                 </a:solidFill>
-                <a:latin typeface="Cabin"/>
-                <a:ea typeface="Cabin"/>
-                <a:cs typeface="Cabin"/>
+                <a:latin typeface="Arial" charset="0"/>
+                <a:ea typeface="Arial" charset="0"/>
+                <a:cs typeface="Arial" charset="0"/>
                 <a:sym typeface="Cabin"/>
               </a:rPr>
               <a:t> is an ordered set</a:t>
@@ -22392,13 +22392,13 @@
               <a:buNone/>
             </a:pPr>
             <a:r>
-              <a:rPr lang="en-US" sz="7600" b="0" i="0" u="none" strike="noStrike" cap="none">
+              <a:rPr lang="en-US" sz="7600" u="none" strike="noStrike" cap="none">
                 <a:solidFill>
                   <a:srgbClr val="FFFF00"/>
                 </a:solidFill>
-                <a:latin typeface="Cabin"/>
-                <a:ea typeface="Cabin"/>
-                <a:cs typeface="Cabin"/>
+                <a:latin typeface="Arial" charset="0"/>
+                <a:ea typeface="Arial" charset="0"/>
+                <a:cs typeface="Arial" charset="0"/>
                 <a:sym typeface="Cabin"/>
               </a:rPr>
               <a:t>Counting Lines in a File</a:t>
@@ -22453,37 +22453,37 @@
               <a:buChar char="•"/>
             </a:pPr>
             <a:r>
-              <a:rPr lang="en-US" sz="3400" b="0" i="0" u="none" strike="noStrike" cap="none">
+              <a:rPr lang="en-US" sz="3400" u="none" strike="noStrike" cap="none">
                 <a:solidFill>
                   <a:schemeClr val="lt1"/>
                 </a:solidFill>
-                <a:latin typeface="Cabin"/>
-                <a:ea typeface="Cabin"/>
-                <a:cs typeface="Cabin"/>
+                <a:latin typeface="Arial" charset="0"/>
+                <a:ea typeface="Arial" charset="0"/>
+                <a:cs typeface="Arial" charset="0"/>
                 <a:sym typeface="Cabin"/>
               </a:rPr>
               <a:t>Open a </a:t>
             </a:r>
             <a:r>
-              <a:rPr lang="en-US" sz="3400" b="0" i="0" u="none" strike="noStrike" cap="none">
+              <a:rPr lang="en-US" sz="3400" u="none" strike="noStrike" cap="none">
                 <a:solidFill>
                   <a:srgbClr val="00FF00"/>
                 </a:solidFill>
-                <a:latin typeface="Cabin"/>
-                <a:ea typeface="Cabin"/>
-                <a:cs typeface="Cabin"/>
+                <a:latin typeface="Arial" charset="0"/>
+                <a:ea typeface="Arial" charset="0"/>
+                <a:cs typeface="Arial" charset="0"/>
                 <a:sym typeface="Cabin"/>
               </a:rPr>
               <a:t>file</a:t>
             </a:r>
             <a:r>
-              <a:rPr lang="en-US" sz="3400" b="0" i="0" u="none" strike="noStrike" cap="none">
+              <a:rPr lang="en-US" sz="3400" u="none" strike="noStrike" cap="none">
                 <a:solidFill>
                   <a:schemeClr val="lt1"/>
                 </a:solidFill>
-                <a:latin typeface="Cabin"/>
-                <a:ea typeface="Cabin"/>
-                <a:cs typeface="Cabin"/>
+                <a:latin typeface="Arial" charset="0"/>
+                <a:ea typeface="Arial" charset="0"/>
+                <a:cs typeface="Arial" charset="0"/>
                 <a:sym typeface="Cabin"/>
               </a:rPr>
               <a:t> read-only</a:t>
@@ -22508,37 +22508,37 @@
               <a:buChar char="•"/>
             </a:pPr>
             <a:r>
-              <a:rPr lang="en-US" sz="3400" b="0" i="0" u="none" strike="noStrike" cap="none">
+              <a:rPr lang="en-US" sz="3400" u="none" strike="noStrike" cap="none">
                 <a:solidFill>
                   <a:schemeClr val="lt1"/>
                 </a:solidFill>
-                <a:latin typeface="Cabin"/>
-                <a:ea typeface="Cabin"/>
-                <a:cs typeface="Cabin"/>
+                <a:latin typeface="Arial" charset="0"/>
+                <a:ea typeface="Arial" charset="0"/>
+                <a:cs typeface="Arial" charset="0"/>
                 <a:sym typeface="Cabin"/>
               </a:rPr>
               <a:t>Use a </a:t>
             </a:r>
             <a:r>
-              <a:rPr lang="en-US" sz="3400" b="0" i="0" u="none" strike="noStrike" cap="none">
+              <a:rPr lang="en-US" sz="3400" u="none" strike="noStrike" cap="none">
                 <a:solidFill>
                   <a:srgbClr val="FFFF00"/>
                 </a:solidFill>
-                <a:latin typeface="Cabin"/>
-                <a:ea typeface="Cabin"/>
-                <a:cs typeface="Cabin"/>
+                <a:latin typeface="Arial" charset="0"/>
+                <a:ea typeface="Arial" charset="0"/>
+                <a:cs typeface="Arial" charset="0"/>
                 <a:sym typeface="Cabin"/>
               </a:rPr>
               <a:t>for</a:t>
             </a:r>
             <a:r>
-              <a:rPr lang="en-US" sz="3400" b="0" i="0" u="none" strike="noStrike" cap="none">
+              <a:rPr lang="en-US" sz="3400" u="none" strike="noStrike" cap="none">
                 <a:solidFill>
                   <a:schemeClr val="lt1"/>
                 </a:solidFill>
-                <a:latin typeface="Cabin"/>
-                <a:ea typeface="Cabin"/>
-                <a:cs typeface="Cabin"/>
+                <a:latin typeface="Arial" charset="0"/>
+                <a:ea typeface="Arial" charset="0"/>
+                <a:cs typeface="Arial" charset="0"/>
                 <a:sym typeface="Cabin"/>
               </a:rPr>
               <a:t> loop to read each line</a:t>
@@ -22563,25 +22563,25 @@
               <a:buChar char="•"/>
             </a:pPr>
             <a:r>
-              <a:rPr lang="en-US" sz="3400" b="0" i="0" u="none" strike="noStrike" cap="none">
+              <a:rPr lang="en-US" sz="3400" u="none" strike="noStrike" cap="none">
                 <a:solidFill>
                   <a:srgbClr val="FF7F00"/>
                 </a:solidFill>
-                <a:latin typeface="Cabin"/>
-                <a:ea typeface="Cabin"/>
-                <a:cs typeface="Cabin"/>
+                <a:latin typeface="Arial" charset="0"/>
+                <a:ea typeface="Arial" charset="0"/>
+                <a:cs typeface="Arial" charset="0"/>
                 <a:sym typeface="Cabin"/>
               </a:rPr>
               <a:t>Count</a:t>
             </a:r>
             <a:r>
-              <a:rPr lang="en-US" sz="3400" b="0" i="0" u="none" strike="noStrike" cap="none">
+              <a:rPr lang="en-US" sz="3400" u="none" strike="noStrike" cap="none">
                 <a:solidFill>
                   <a:schemeClr val="lt1"/>
                 </a:solidFill>
-                <a:latin typeface="Cabin"/>
-                <a:ea typeface="Cabin"/>
-                <a:cs typeface="Cabin"/>
+                <a:latin typeface="Arial" charset="0"/>
+                <a:ea typeface="Arial" charset="0"/>
+                <a:cs typeface="Arial" charset="0"/>
                 <a:sym typeface="Cabin"/>
               </a:rPr>
               <a:t> the lines and print out the number of lines</a:t>
@@ -23166,13 +23166,13 @@
               <a:buNone/>
             </a:pPr>
             <a:r>
-              <a:rPr lang="en-US" sz="7600" b="0" i="0" u="none" strike="noStrike" cap="none">
+              <a:rPr lang="en-US" sz="7600" u="none" strike="noStrike" cap="none">
                 <a:solidFill>
                   <a:srgbClr val="FFFF00"/>
                 </a:solidFill>
-                <a:latin typeface="Cabin"/>
-                <a:ea typeface="Cabin"/>
-                <a:cs typeface="Cabin"/>
+                <a:latin typeface="Arial" charset="0"/>
+                <a:ea typeface="Arial" charset="0"/>
+                <a:cs typeface="Arial" charset="0"/>
                 <a:sym typeface="Cabin"/>
               </a:rPr>
               <a:t>Reading the *Whole* File</a:t>
@@ -23227,49 +23227,49 @@
               <a:buChar char="•"/>
             </a:pPr>
             <a:r>
-              <a:rPr lang="en-US" sz="3400" b="0" i="0" u="none" strike="noStrike" cap="none">
+              <a:rPr lang="en-US" sz="3400" u="none" strike="noStrike" cap="none">
                 <a:solidFill>
                   <a:schemeClr val="lt1"/>
                 </a:solidFill>
-                <a:latin typeface="Cabin"/>
-                <a:ea typeface="Cabin"/>
-                <a:cs typeface="Cabin"/>
+                <a:latin typeface="Arial" charset="0"/>
+                <a:ea typeface="Arial" charset="0"/>
+                <a:cs typeface="Arial" charset="0"/>
                 <a:sym typeface="Cabin"/>
               </a:rPr>
               <a:t>We can </a:t>
             </a:r>
             <a:r>
-              <a:rPr lang="en-US" sz="3400" b="0" i="0" u="none" strike="noStrike" cap="none">
+              <a:rPr lang="en-US" sz="3400" u="none" strike="noStrike" cap="none">
                 <a:solidFill>
                   <a:srgbClr val="FF7F00"/>
                 </a:solidFill>
-                <a:latin typeface="Cabin"/>
-                <a:ea typeface="Cabin"/>
-                <a:cs typeface="Cabin"/>
+                <a:latin typeface="Arial" charset="0"/>
+                <a:ea typeface="Arial" charset="0"/>
+                <a:cs typeface="Arial" charset="0"/>
                 <a:sym typeface="Cabin"/>
               </a:rPr>
               <a:t>read</a:t>
             </a:r>
             <a:r>
-              <a:rPr lang="en-US" sz="3400" b="0" i="0" u="none" strike="noStrike" cap="none">
+              <a:rPr lang="en-US" sz="3400" u="none" strike="noStrike" cap="none">
                 <a:solidFill>
                   <a:schemeClr val="lt1"/>
                 </a:solidFill>
-                <a:latin typeface="Cabin"/>
-                <a:ea typeface="Cabin"/>
-                <a:cs typeface="Cabin"/>
+                <a:latin typeface="Arial" charset="0"/>
+                <a:ea typeface="Arial" charset="0"/>
+                <a:cs typeface="Arial" charset="0"/>
                 <a:sym typeface="Cabin"/>
               </a:rPr>
               <a:t> the whole file (newlines and all) into a </a:t>
             </a:r>
             <a:r>
-              <a:rPr lang="en-US" sz="3400" b="0" i="0" u="none" strike="noStrike" cap="none">
+              <a:rPr lang="en-US" sz="3400" u="none" strike="noStrike" cap="none">
                 <a:solidFill>
                   <a:srgbClr val="00FFFF"/>
                 </a:solidFill>
-                <a:latin typeface="Cabin"/>
-                <a:ea typeface="Cabin"/>
-                <a:cs typeface="Cabin"/>
+                <a:latin typeface="Arial" charset="0"/>
+                <a:ea typeface="Arial" charset="0"/>
+                <a:cs typeface="Arial" charset="0"/>
                 <a:sym typeface="Cabin"/>
               </a:rPr>
               <a:t>single string</a:t>
@@ -23789,13 +23789,13 @@
               <a:buNone/>
             </a:pPr>
             <a:r>
-              <a:rPr lang="en-US" sz="7600" b="0" i="0" u="none" strike="noStrike" cap="none">
+              <a:rPr lang="en-US" sz="7600" u="none" strike="noStrike" cap="none">
                 <a:solidFill>
                   <a:srgbClr val="FFFF00"/>
                 </a:solidFill>
-                <a:latin typeface="Cabin"/>
-                <a:ea typeface="Cabin"/>
-                <a:cs typeface="Cabin"/>
+                <a:latin typeface="Arial" charset="0"/>
+                <a:ea typeface="Arial" charset="0"/>
+                <a:cs typeface="Arial" charset="0"/>
                 <a:sym typeface="Cabin"/>
               </a:rPr>
               <a:t>Searching Through a File</a:t>
@@ -23850,61 +23850,61 @@
               <a:buChar char="•"/>
             </a:pPr>
             <a:r>
-              <a:rPr lang="en-US" sz="3400" b="0" i="0" u="none" strike="noStrike" cap="none">
+              <a:rPr lang="en-US" sz="3400" u="none" strike="noStrike" cap="none">
                 <a:solidFill>
                   <a:schemeClr val="lt1"/>
                 </a:solidFill>
-                <a:latin typeface="Cabin"/>
-                <a:ea typeface="Cabin"/>
-                <a:cs typeface="Cabin"/>
+                <a:latin typeface="Arial" charset="0"/>
+                <a:ea typeface="Arial" charset="0"/>
+                <a:cs typeface="Arial" charset="0"/>
                 <a:sym typeface="Cabin"/>
               </a:rPr>
               <a:t>We can put an </a:t>
             </a:r>
             <a:r>
-              <a:rPr lang="en-US" sz="3400" b="0" i="0" u="none" strike="noStrike" cap="none">
+              <a:rPr lang="en-US" sz="3400" u="none" strike="noStrike" cap="none">
                 <a:solidFill>
                   <a:srgbClr val="FFFF00"/>
                 </a:solidFill>
-                <a:latin typeface="Cabin"/>
-                <a:ea typeface="Cabin"/>
-                <a:cs typeface="Cabin"/>
+                <a:latin typeface="Arial" charset="0"/>
+                <a:ea typeface="Arial" charset="0"/>
+                <a:cs typeface="Arial" charset="0"/>
                 <a:sym typeface="Cabin"/>
               </a:rPr>
               <a:t>if </a:t>
             </a:r>
             <a:r>
-              <a:rPr lang="en-US" sz="3400" b="0" i="0" u="none" strike="noStrike" cap="none">
+              <a:rPr lang="en-US" sz="3400" u="none" strike="noStrike" cap="none">
                 <a:solidFill>
                   <a:schemeClr val="lt1"/>
                 </a:solidFill>
-                <a:latin typeface="Cabin"/>
-                <a:ea typeface="Cabin"/>
-                <a:cs typeface="Cabin"/>
+                <a:latin typeface="Arial" charset="0"/>
+                <a:ea typeface="Arial" charset="0"/>
+                <a:cs typeface="Arial" charset="0"/>
                 <a:sym typeface="Cabin"/>
               </a:rPr>
               <a:t>statement in our </a:t>
             </a:r>
             <a:r>
-              <a:rPr lang="en-US" sz="3400" b="0" i="0" u="none" strike="noStrike" cap="none">
+              <a:rPr lang="en-US" sz="3400" u="none" strike="noStrike" cap="none">
                 <a:solidFill>
                   <a:srgbClr val="FFFF00"/>
                 </a:solidFill>
-                <a:latin typeface="Cabin"/>
-                <a:ea typeface="Cabin"/>
-                <a:cs typeface="Cabin"/>
+                <a:latin typeface="Arial" charset="0"/>
+                <a:ea typeface="Arial" charset="0"/>
+                <a:cs typeface="Arial" charset="0"/>
                 <a:sym typeface="Cabin"/>
               </a:rPr>
               <a:t>for</a:t>
             </a:r>
             <a:r>
-              <a:rPr lang="en-US" sz="3400" b="0" i="0" u="none" strike="noStrike" cap="none">
+              <a:rPr lang="en-US" sz="3400" u="none" strike="noStrike" cap="none">
                 <a:solidFill>
                   <a:schemeClr val="lt1"/>
                 </a:solidFill>
-                <a:latin typeface="Cabin"/>
-                <a:ea typeface="Cabin"/>
-                <a:cs typeface="Cabin"/>
+                <a:latin typeface="Arial" charset="0"/>
+                <a:ea typeface="Arial" charset="0"/>
+                <a:cs typeface="Arial" charset="0"/>
                 <a:sym typeface="Cabin"/>
               </a:rPr>
               <a:t> loop to only print lines that meet some criteria</a:t>
@@ -24362,13 +24362,13 @@
               <a:buNone/>
             </a:pPr>
             <a:r>
-              <a:rPr lang="en-US" sz="7600" b="0" i="0" u="none" strike="noStrike" cap="none">
+              <a:rPr lang="en-US" sz="7600" u="none" strike="noStrike" cap="none">
                 <a:solidFill>
                   <a:srgbClr val="FFFF00"/>
                 </a:solidFill>
-                <a:latin typeface="Cabin"/>
-                <a:ea typeface="Cabin"/>
-                <a:cs typeface="Cabin"/>
+                <a:latin typeface="Arial" charset="0"/>
+                <a:ea typeface="Arial" charset="0"/>
+                <a:cs typeface="Arial" charset="0"/>
                 <a:sym typeface="Cabin"/>
               </a:rPr>
               <a:t>OOPS!</a:t>
@@ -24419,13 +24419,13 @@
               <a:buNone/>
             </a:pPr>
             <a:r>
-              <a:rPr lang="en-US" sz="3600" b="0" i="0" u="none" strike="noStrike" cap="none">
+              <a:rPr lang="en-US" sz="3600" u="none" strike="noStrike" cap="none">
                 <a:solidFill>
                   <a:schemeClr val="lt1"/>
                 </a:solidFill>
-                <a:latin typeface="Cabin"/>
-                <a:ea typeface="Cabin"/>
-                <a:cs typeface="Cabin"/>
+                <a:latin typeface="Arial" charset="0"/>
+                <a:ea typeface="Arial" charset="0"/>
+                <a:cs typeface="Arial" charset="0"/>
                 <a:sym typeface="Cabin"/>
               </a:rPr>
               <a:t>What are all these blank lines doing here?</a:t>
@@ -24755,13 +24755,13 @@
               <a:buNone/>
             </a:pPr>
             <a:r>
-              <a:rPr lang="en-US" sz="7600" b="0" i="0" u="none" strike="noStrike" cap="none">
+              <a:rPr lang="en-US" sz="7600" u="none" strike="noStrike" cap="none">
                 <a:solidFill>
                   <a:srgbClr val="FFFF00"/>
                 </a:solidFill>
-                <a:latin typeface="Cabin"/>
-                <a:ea typeface="Cabin"/>
-                <a:cs typeface="Cabin"/>
+                <a:latin typeface="Arial" charset="0"/>
+                <a:ea typeface="Arial" charset="0"/>
+                <a:cs typeface="Arial" charset="0"/>
                 <a:sym typeface="Cabin"/>
               </a:rPr>
               <a:t>OOPS!</a:t>
@@ -24807,13 +24807,13 @@
               <a:buNone/>
             </a:pPr>
             <a:r>
-              <a:rPr lang="en-US" sz="3600" b="0" i="0" u="none" strike="noStrike" cap="none">
+              <a:rPr lang="en-US" sz="3600" u="none" strike="noStrike" cap="none">
                 <a:solidFill>
                   <a:schemeClr val="lt1"/>
                 </a:solidFill>
-                <a:latin typeface="Cabin"/>
-                <a:ea typeface="Cabin"/>
-                <a:cs typeface="Cabin"/>
+                <a:latin typeface="Arial" charset="0"/>
+                <a:ea typeface="Arial" charset="0"/>
+                <a:cs typeface="Arial" charset="0"/>
                 <a:sym typeface="Cabin"/>
               </a:rPr>
               <a:t>What are all these blank lines doing here?</a:t>
@@ -25221,9 +25221,9 @@
                 <a:solidFill>
                   <a:schemeClr val="lt1"/>
                 </a:solidFill>
-                <a:latin typeface="Cabin"/>
-                <a:ea typeface="Cabin"/>
-                <a:cs typeface="Cabin"/>
+                <a:latin typeface="Arial" charset="0"/>
+                <a:ea typeface="Arial" charset="0"/>
+                <a:cs typeface="Arial" charset="0"/>
                 <a:sym typeface="Cabin"/>
               </a:rPr>
               <a:t>Each </a:t>
@@ -25233,9 +25233,9 @@
                 <a:solidFill>
                   <a:srgbClr val="00FF00"/>
                 </a:solidFill>
-                <a:latin typeface="Cabin"/>
-                <a:ea typeface="Cabin"/>
-                <a:cs typeface="Cabin"/>
+                <a:latin typeface="Arial" charset="0"/>
+                <a:ea typeface="Arial" charset="0"/>
+                <a:cs typeface="Arial" charset="0"/>
                 <a:sym typeface="Cabin"/>
               </a:rPr>
               <a:t>line</a:t>
@@ -25245,9 +25245,9 @@
                 <a:solidFill>
                   <a:schemeClr val="lt1"/>
                 </a:solidFill>
-                <a:latin typeface="Cabin"/>
-                <a:ea typeface="Cabin"/>
-                <a:cs typeface="Cabin"/>
+                <a:latin typeface="Arial" charset="0"/>
+                <a:ea typeface="Arial" charset="0"/>
+                <a:cs typeface="Arial" charset="0"/>
                 <a:sym typeface="Cabin"/>
               </a:rPr>
               <a:t> from the file has a </a:t>
@@ -25257,9 +25257,9 @@
                 <a:solidFill>
                   <a:srgbClr val="00FF00"/>
                 </a:solidFill>
-                <a:latin typeface="Cabin"/>
-                <a:ea typeface="Cabin"/>
-                <a:cs typeface="Cabin"/>
+                <a:latin typeface="Arial" charset="0"/>
+                <a:ea typeface="Arial" charset="0"/>
+                <a:cs typeface="Arial" charset="0"/>
                 <a:sym typeface="Cabin"/>
               </a:rPr>
               <a:t>newline</a:t>
@@ -25269,9 +25269,9 @@
                 <a:solidFill>
                   <a:schemeClr val="lt1"/>
                 </a:solidFill>
-                <a:latin typeface="Cabin"/>
-                <a:ea typeface="Cabin"/>
-                <a:cs typeface="Cabin"/>
+                <a:latin typeface="Arial" charset="0"/>
+                <a:ea typeface="Arial" charset="0"/>
+                <a:cs typeface="Arial" charset="0"/>
                 <a:sym typeface="Cabin"/>
               </a:rPr>
               <a:t> at the end</a:t>
@@ -25296,9 +25296,9 @@
                 <a:solidFill>
                   <a:schemeClr val="lt1"/>
                 </a:solidFill>
-                <a:latin typeface="Cabin"/>
-                <a:ea typeface="Cabin"/>
-                <a:cs typeface="Cabin"/>
+                <a:latin typeface="Arial" charset="0"/>
+                <a:ea typeface="Arial" charset="0"/>
+                <a:cs typeface="Arial" charset="0"/>
                 <a:sym typeface="Cabin"/>
               </a:rPr>
               <a:t>The </a:t>
@@ -25308,9 +25308,9 @@
                 <a:solidFill>
                   <a:srgbClr val="FFFF00"/>
                 </a:solidFill>
-                <a:latin typeface="Cabin"/>
-                <a:ea typeface="Cabin"/>
-                <a:cs typeface="Cabin"/>
+                <a:latin typeface="Arial" charset="0"/>
+                <a:ea typeface="Arial" charset="0"/>
+                <a:cs typeface="Arial" charset="0"/>
                 <a:sym typeface="Cabin"/>
               </a:rPr>
               <a:t>print</a:t>
@@ -25320,9 +25320,9 @@
                 <a:solidFill>
                   <a:schemeClr val="lt1"/>
                 </a:solidFill>
-                <a:latin typeface="Cabin"/>
-                <a:ea typeface="Cabin"/>
-                <a:cs typeface="Cabin"/>
+                <a:latin typeface="Arial" charset="0"/>
+                <a:ea typeface="Arial" charset="0"/>
+                <a:cs typeface="Arial" charset="0"/>
                 <a:sym typeface="Cabin"/>
               </a:rPr>
               <a:t> statement adds a </a:t>
@@ -25332,9 +25332,9 @@
                 <a:solidFill>
                   <a:srgbClr val="FFFF00"/>
                 </a:solidFill>
-                <a:latin typeface="Cabin"/>
-                <a:ea typeface="Cabin"/>
-                <a:cs typeface="Cabin"/>
+                <a:latin typeface="Arial" charset="0"/>
+                <a:ea typeface="Arial" charset="0"/>
+                <a:cs typeface="Arial" charset="0"/>
                 <a:sym typeface="Cabin"/>
               </a:rPr>
               <a:t>newline</a:t>
@@ -25344,9 +25344,9 @@
                 <a:solidFill>
                   <a:schemeClr val="lt1"/>
                 </a:solidFill>
-                <a:latin typeface="Cabin"/>
-                <a:ea typeface="Cabin"/>
-                <a:cs typeface="Cabin"/>
+                <a:latin typeface="Arial" charset="0"/>
+                <a:ea typeface="Arial" charset="0"/>
+                <a:cs typeface="Arial" charset="0"/>
                 <a:sym typeface="Cabin"/>
               </a:rPr>
               <a:t> to each line</a:t>
@@ -25426,13 +25426,13 @@
               <a:buNone/>
             </a:pPr>
             <a:r>
-              <a:rPr lang="en-US" sz="7600" b="0" i="0" u="none" strike="noStrike" cap="none">
+              <a:rPr lang="en-US" sz="7600" u="none" strike="noStrike" cap="none">
                 <a:solidFill>
                   <a:srgbClr val="FFFF00"/>
                 </a:solidFill>
-                <a:latin typeface="Cabin"/>
-                <a:ea typeface="Cabin"/>
-                <a:cs typeface="Cabin"/>
+                <a:latin typeface="Arial" charset="0"/>
+                <a:ea typeface="Arial" charset="0"/>
+                <a:cs typeface="Arial" charset="0"/>
                 <a:sym typeface="Cabin"/>
               </a:rPr>
               <a:t>Searching Through a File (fixed)</a:t>
@@ -25483,13 +25483,13 @@
               <a:buFont typeface="Cabin"/>
             </a:pPr>
             <a:r>
-              <a:rPr lang="en-US" sz="3400" b="0" i="0" u="none" strike="noStrike" cap="none">
+              <a:rPr lang="en-US" sz="3400" u="none" strike="noStrike" cap="none">
                 <a:solidFill>
                   <a:schemeClr val="lt1"/>
                 </a:solidFill>
-                <a:latin typeface="Cabin"/>
-                <a:ea typeface="Cabin"/>
-                <a:cs typeface="Cabin"/>
+                <a:latin typeface="Arial" charset="0"/>
+                <a:ea typeface="Arial" charset="0"/>
+                <a:cs typeface="Arial" charset="0"/>
                 <a:sym typeface="Cabin"/>
               </a:rPr>
               <a:t>We can strip the whitespace from the right</a:t>
@@ -25499,45 +25499,45 @@
                 <a:solidFill>
                   <a:schemeClr val="lt1"/>
                 </a:solidFill>
-                <a:latin typeface="Cabin"/>
-                <a:ea typeface="Cabin"/>
-                <a:cs typeface="Cabin"/>
+                <a:latin typeface="Arial" charset="0"/>
+                <a:ea typeface="Arial" charset="0"/>
+                <a:cs typeface="Arial" charset="0"/>
                 <a:sym typeface="Cabin"/>
               </a:rPr>
               <a:t>-</a:t>
             </a:r>
             <a:r>
-              <a:rPr lang="en-US" sz="3400" b="0" i="0" u="none" strike="noStrike" cap="none">
+              <a:rPr lang="en-US" sz="3400" u="none" strike="noStrike" cap="none">
                 <a:solidFill>
                   <a:schemeClr val="lt1"/>
                 </a:solidFill>
-                <a:latin typeface="Cabin"/>
-                <a:ea typeface="Cabin"/>
-                <a:cs typeface="Cabin"/>
+                <a:latin typeface="Arial" charset="0"/>
+                <a:ea typeface="Arial" charset="0"/>
+                <a:cs typeface="Arial" charset="0"/>
                 <a:sym typeface="Cabin"/>
               </a:rPr>
               <a:t>hand side of the string using </a:t>
             </a:r>
             <a:r>
-              <a:rPr lang="en-US" sz="3400" b="0" i="0" u="none" strike="noStrike" cap="none">
+              <a:rPr lang="en-US" sz="3400" u="none" strike="noStrike" cap="none">
                 <a:solidFill>
                   <a:srgbClr val="FF7F00"/>
                 </a:solidFill>
-                <a:latin typeface="Cabin"/>
-                <a:ea typeface="Cabin"/>
-                <a:cs typeface="Cabin"/>
+                <a:latin typeface="Arial" charset="0"/>
+                <a:ea typeface="Arial" charset="0"/>
+                <a:cs typeface="Arial" charset="0"/>
                 <a:sym typeface="Cabin"/>
               </a:rPr>
               <a:t>rstrip</a:t>
             </a:r>
             <a:r>
-              <a:rPr lang="en-US" sz="3400" b="0" i="0" u="none" strike="noStrike" cap="none">
+              <a:rPr lang="en-US" sz="3400" u="none" strike="noStrike" cap="none">
                 <a:solidFill>
                   <a:schemeClr val="lt1"/>
                 </a:solidFill>
-                <a:latin typeface="Cabin"/>
-                <a:ea typeface="Cabin"/>
-                <a:cs typeface="Cabin"/>
+                <a:latin typeface="Arial" charset="0"/>
+                <a:ea typeface="Arial" charset="0"/>
+                <a:cs typeface="Arial" charset="0"/>
                 <a:sym typeface="Cabin"/>
               </a:rPr>
               <a:t>() from the string library</a:t>
@@ -25558,13 +25558,13 @@
               <a:buFont typeface="Cabin"/>
             </a:pPr>
             <a:r>
-              <a:rPr lang="en-US" sz="3400" b="0" i="0" u="none" strike="noStrike" cap="none">
+              <a:rPr lang="en-US" sz="3400" u="none" strike="noStrike" cap="none">
                 <a:solidFill>
                   <a:schemeClr val="lt1"/>
                 </a:solidFill>
-                <a:latin typeface="Cabin"/>
-                <a:ea typeface="Cabin"/>
-                <a:cs typeface="Cabin"/>
+                <a:latin typeface="Arial" charset="0"/>
+                <a:ea typeface="Arial" charset="0"/>
+                <a:cs typeface="Arial" charset="0"/>
                 <a:sym typeface="Cabin"/>
               </a:rPr>
               <a:t>The newline is considered </a:t>
@@ -25574,21 +25574,21 @@
                 <a:solidFill>
                   <a:schemeClr val="lt1"/>
                 </a:solidFill>
-                <a:latin typeface="Cabin"/>
-                <a:ea typeface="Cabin"/>
-                <a:cs typeface="Cabin"/>
+                <a:latin typeface="Arial" charset="0"/>
+                <a:ea typeface="Arial" charset="0"/>
+                <a:cs typeface="Arial" charset="0"/>
                 <a:sym typeface="Cabin"/>
               </a:rPr>
               <a:t>“</a:t>
             </a:r>
             <a:r>
-              <a:rPr lang="en-US" sz="3400" b="0" i="0" u="none" strike="noStrike" cap="none">
+              <a:rPr lang="en-US" sz="3400" u="none" strike="noStrike" cap="none">
                 <a:solidFill>
                   <a:schemeClr val="lt1"/>
                 </a:solidFill>
-                <a:latin typeface="Cabin"/>
-                <a:ea typeface="Cabin"/>
-                <a:cs typeface="Cabin"/>
+                <a:latin typeface="Arial" charset="0"/>
+                <a:ea typeface="Arial" charset="0"/>
+                <a:cs typeface="Arial" charset="0"/>
                 <a:sym typeface="Cabin"/>
               </a:rPr>
               <a:t>white space</a:t>
@@ -25598,33 +25598,33 @@
                 <a:solidFill>
                   <a:schemeClr val="lt1"/>
                 </a:solidFill>
-                <a:latin typeface="Cabin"/>
-                <a:ea typeface="Cabin"/>
-                <a:cs typeface="Cabin"/>
+                <a:latin typeface="Arial" charset="0"/>
+                <a:ea typeface="Arial" charset="0"/>
+                <a:cs typeface="Arial" charset="0"/>
                 <a:sym typeface="Cabin"/>
               </a:rPr>
               <a:t>”</a:t>
             </a:r>
             <a:r>
-              <a:rPr lang="en-US" sz="3400" b="0" i="0" u="none" strike="noStrike" cap="none">
+              <a:rPr lang="en-US" sz="3400" u="none" strike="noStrike" cap="none">
                 <a:solidFill>
                   <a:schemeClr val="lt1"/>
                 </a:solidFill>
-                <a:latin typeface="Cabin"/>
-                <a:ea typeface="Cabin"/>
-                <a:cs typeface="Cabin"/>
+                <a:latin typeface="Arial" charset="0"/>
+                <a:ea typeface="Arial" charset="0"/>
+                <a:cs typeface="Arial" charset="0"/>
                 <a:sym typeface="Cabin"/>
               </a:rPr>
               <a:t> and is </a:t>
             </a:r>
             <a:r>
-              <a:rPr lang="en-US" sz="3400" b="0" i="0" u="none" strike="noStrike" cap="none">
+              <a:rPr lang="en-US" sz="3400" u="none" strike="noStrike" cap="none">
                 <a:solidFill>
                   <a:srgbClr val="FF7F00"/>
                 </a:solidFill>
-                <a:latin typeface="Cabin"/>
-                <a:ea typeface="Cabin"/>
-                <a:cs typeface="Cabin"/>
+                <a:latin typeface="Arial" charset="0"/>
+                <a:ea typeface="Arial" charset="0"/>
+                <a:cs typeface="Arial" charset="0"/>
                 <a:sym typeface="Cabin"/>
               </a:rPr>
               <a:t>stripped</a:t>
@@ -26144,13 +26144,13 @@
               <a:buNone/>
             </a:pPr>
             <a:r>
-              <a:rPr lang="en-US" sz="3200" b="0" i="0" u="none" strike="noStrike" cap="none">
+              <a:rPr lang="en-US" sz="3200" u="none" strike="noStrike" cap="none">
                 <a:solidFill>
                   <a:srgbClr val="FF00FF"/>
                 </a:solidFill>
-                <a:latin typeface="Cabin"/>
-                <a:ea typeface="Cabin"/>
-                <a:cs typeface="Cabin"/>
+                <a:latin typeface="Arial" charset="0"/>
+                <a:ea typeface="Arial" charset="0"/>
+                <a:cs typeface="Arial" charset="0"/>
                 <a:sym typeface="Cabin"/>
               </a:rPr>
               <a:t>From: stephen.marquard@uct.ac.za</a:t>
@@ -26175,13 +26175,13 @@
               <a:buNone/>
             </a:pPr>
             <a:r>
-              <a:rPr lang="en-US" sz="3200" b="0" i="0" u="none" strike="noStrike" cap="none">
+              <a:rPr lang="en-US" sz="3200" u="none" strike="noStrike" cap="none">
                 <a:solidFill>
                   <a:srgbClr val="FF00FF"/>
                 </a:solidFill>
-                <a:latin typeface="Cabin"/>
-                <a:ea typeface="Cabin"/>
-                <a:cs typeface="Cabin"/>
+                <a:latin typeface="Arial" charset="0"/>
+                <a:ea typeface="Arial" charset="0"/>
+                <a:cs typeface="Arial" charset="0"/>
                 <a:sym typeface="Cabin"/>
               </a:rPr>
               <a:t>From: louis@media.berkeley.edu</a:t>
@@ -26206,13 +26206,13 @@
               <a:buNone/>
             </a:pPr>
             <a:r>
-              <a:rPr lang="en-US" sz="3200" b="0" i="0" u="none" strike="noStrike" cap="none">
+              <a:rPr lang="en-US" sz="3200" u="none" strike="noStrike" cap="none">
                 <a:solidFill>
                   <a:srgbClr val="FF00FF"/>
                 </a:solidFill>
-                <a:latin typeface="Cabin"/>
-                <a:ea typeface="Cabin"/>
-                <a:cs typeface="Cabin"/>
+                <a:latin typeface="Arial" charset="0"/>
+                <a:ea typeface="Arial" charset="0"/>
+                <a:cs typeface="Arial" charset="0"/>
                 <a:sym typeface="Cabin"/>
               </a:rPr>
               <a:t>From: zqian@umich.edu</a:t>
@@ -26237,13 +26237,13 @@
               <a:buNone/>
             </a:pPr>
             <a:r>
-              <a:rPr lang="en-US" sz="3200" b="0" i="0" u="none" strike="noStrike" cap="none">
+              <a:rPr lang="en-US" sz="3200" u="none" strike="noStrike" cap="none">
                 <a:solidFill>
                   <a:srgbClr val="FF00FF"/>
                 </a:solidFill>
-                <a:latin typeface="Cabin"/>
-                <a:ea typeface="Cabin"/>
-                <a:cs typeface="Cabin"/>
+                <a:latin typeface="Arial" charset="0"/>
+                <a:ea typeface="Arial" charset="0"/>
+                <a:cs typeface="Arial" charset="0"/>
                 <a:sym typeface="Cabin"/>
               </a:rPr>
               <a:t>From: rjlowe@iupui.edu</a:t>
@@ -26268,13 +26268,13 @@
               <a:buNone/>
             </a:pPr>
             <a:r>
-              <a:rPr lang="en-US" sz="3200" b="0" i="0" u="none" strike="noStrike" cap="none">
+              <a:rPr lang="en-US" sz="3200" u="none" strike="noStrike" cap="none">
                 <a:solidFill>
                   <a:srgbClr val="FF00FF"/>
                 </a:solidFill>
-                <a:latin typeface="Cabin"/>
-                <a:ea typeface="Cabin"/>
-                <a:cs typeface="Cabin"/>
+                <a:latin typeface="Arial" charset="0"/>
+                <a:ea typeface="Arial" charset="0"/>
+                <a:cs typeface="Arial" charset="0"/>
                 <a:sym typeface="Cabin"/>
               </a:rPr>
               <a:t>....</a:t>
@@ -26354,13 +26354,13 @@
               <a:buNone/>
             </a:pPr>
             <a:r>
-              <a:rPr lang="en-US" sz="7600" b="0" i="0" u="none" strike="noStrike" cap="none">
+              <a:rPr lang="en-US" sz="7600" u="none" strike="noStrike" cap="none">
                 <a:solidFill>
                   <a:srgbClr val="FFFF00"/>
                 </a:solidFill>
-                <a:latin typeface="Cabin"/>
-                <a:ea typeface="Cabin"/>
-                <a:cs typeface="Cabin"/>
+                <a:latin typeface="Arial" charset="0"/>
+                <a:ea typeface="Arial" charset="0"/>
+                <a:cs typeface="Arial" charset="0"/>
                 <a:sym typeface="Cabin"/>
               </a:rPr>
               <a:t>Skipping with continue</a:t>
@@ -26411,13 +26411,13 @@
               <a:buFont typeface="Cabin"/>
             </a:pPr>
             <a:r>
-              <a:rPr lang="en-US" sz="3600" b="0" i="0" u="none" strike="noStrike" cap="none">
+              <a:rPr lang="en-US" sz="3600" u="none" strike="noStrike" cap="none">
                 <a:solidFill>
                   <a:schemeClr val="lt1"/>
                 </a:solidFill>
-                <a:latin typeface="Cabin"/>
-                <a:ea typeface="Cabin"/>
-                <a:cs typeface="Cabin"/>
+                <a:latin typeface="Arial" charset="0"/>
+                <a:ea typeface="Arial" charset="0"/>
+                <a:cs typeface="Arial" charset="0"/>
                 <a:sym typeface="Cabin"/>
               </a:rPr>
               <a:t>We can </a:t>
@@ -26427,45 +26427,45 @@
                 <a:solidFill>
                   <a:schemeClr val="lt1"/>
                 </a:solidFill>
-                <a:latin typeface="Cabin"/>
-                <a:ea typeface="Cabin"/>
-                <a:cs typeface="Cabin"/>
+                <a:latin typeface="Arial" charset="0"/>
+                <a:ea typeface="Arial" charset="0"/>
+                <a:cs typeface="Arial" charset="0"/>
                 <a:sym typeface="Cabin"/>
               </a:rPr>
               <a:t>convenient</a:t>
             </a:r>
             <a:r>
-              <a:rPr lang="en-US" sz="3600" b="0" i="0" u="none" strike="noStrike" cap="none">
+              <a:rPr lang="en-US" sz="3600" u="none" strike="noStrike" cap="none">
                 <a:solidFill>
                   <a:schemeClr val="lt1"/>
                 </a:solidFill>
-                <a:latin typeface="Cabin"/>
-                <a:ea typeface="Cabin"/>
-                <a:cs typeface="Cabin"/>
+                <a:latin typeface="Arial" charset="0"/>
+                <a:ea typeface="Arial" charset="0"/>
+                <a:cs typeface="Arial" charset="0"/>
                 <a:sym typeface="Cabin"/>
               </a:rPr>
               <a:t>ly skip a line by using the </a:t>
             </a:r>
             <a:r>
-              <a:rPr lang="en-US" sz="3600" b="0" i="0" u="none" strike="noStrike" cap="none">
+              <a:rPr lang="en-US" sz="3600" u="none" strike="noStrike" cap="none">
                 <a:solidFill>
                   <a:srgbClr val="FFFF00"/>
                 </a:solidFill>
-                <a:latin typeface="Cabin"/>
-                <a:ea typeface="Cabin"/>
-                <a:cs typeface="Cabin"/>
+                <a:latin typeface="Arial" charset="0"/>
+                <a:ea typeface="Arial" charset="0"/>
+                <a:cs typeface="Arial" charset="0"/>
                 <a:sym typeface="Cabin"/>
               </a:rPr>
               <a:t>continue</a:t>
             </a:r>
             <a:r>
-              <a:rPr lang="en-US" sz="3600" b="0" i="0" u="none" strike="noStrike" cap="none">
+              <a:rPr lang="en-US" sz="3600" u="none" strike="noStrike" cap="none">
                 <a:solidFill>
                   <a:schemeClr val="lt1"/>
                 </a:solidFill>
-                <a:latin typeface="Cabin"/>
-                <a:ea typeface="Cabin"/>
-                <a:cs typeface="Cabin"/>
+                <a:latin typeface="Arial" charset="0"/>
+                <a:ea typeface="Arial" charset="0"/>
+                <a:cs typeface="Arial" charset="0"/>
                 <a:sym typeface="Cabin"/>
               </a:rPr>
               <a:t> statement</a:t>
@@ -27107,49 +27107,49 @@
               <a:buNone/>
             </a:pPr>
             <a:r>
-              <a:rPr lang="en-US" sz="7600" b="0" i="0" u="none" strike="noStrike" cap="none">
+              <a:rPr lang="en-US" sz="7600" u="none" strike="noStrike" cap="none">
                 <a:solidFill>
                   <a:schemeClr val="lt1"/>
                 </a:solidFill>
-                <a:latin typeface="Cabin"/>
-                <a:ea typeface="Cabin"/>
-                <a:cs typeface="Cabin"/>
+                <a:latin typeface="Arial" charset="0"/>
+                <a:ea typeface="Arial" charset="0"/>
+                <a:cs typeface="Arial" charset="0"/>
                 <a:sym typeface="Cabin"/>
               </a:rPr>
               <a:t>Using </a:t>
             </a:r>
             <a:r>
-              <a:rPr lang="en-US" sz="7600" b="0" i="0" u="none" strike="noStrike" cap="none">
+              <a:rPr lang="en-US" sz="7600" u="none" strike="noStrike" cap="none">
                 <a:solidFill>
                   <a:srgbClr val="FFFF00"/>
                 </a:solidFill>
-                <a:latin typeface="Cabin"/>
-                <a:ea typeface="Cabin"/>
-                <a:cs typeface="Cabin"/>
+                <a:latin typeface="Arial" charset="0"/>
+                <a:ea typeface="Arial" charset="0"/>
+                <a:cs typeface="Arial" charset="0"/>
                 <a:sym typeface="Cabin"/>
               </a:rPr>
               <a:t>in</a:t>
             </a:r>
             <a:r>
-              <a:rPr lang="en-US" sz="7600" b="0" i="0" u="none" strike="noStrike" cap="none">
+              <a:rPr lang="en-US" sz="7600" u="none" strike="noStrike" cap="none">
                 <a:solidFill>
                   <a:schemeClr val="lt1"/>
                 </a:solidFill>
-                <a:latin typeface="Cabin"/>
-                <a:ea typeface="Cabin"/>
-                <a:cs typeface="Cabin"/>
+                <a:latin typeface="Arial" charset="0"/>
+                <a:ea typeface="Arial" charset="0"/>
+                <a:cs typeface="Arial" charset="0"/>
                 <a:sym typeface="Cabin"/>
               </a:rPr>
               <a:t> to select </a:t>
             </a:r>
             <a:r>
-              <a:rPr lang="en-US" sz="7600" b="0" i="0" u="none" strike="noStrike" cap="none">
+              <a:rPr lang="en-US" sz="7600" u="none" strike="noStrike" cap="none">
                 <a:solidFill>
                   <a:srgbClr val="00FF00"/>
                 </a:solidFill>
-                <a:latin typeface="Cabin"/>
-                <a:ea typeface="Cabin"/>
-                <a:cs typeface="Cabin"/>
+                <a:latin typeface="Arial" charset="0"/>
+                <a:ea typeface="Arial" charset="0"/>
+                <a:cs typeface="Arial" charset="0"/>
                 <a:sym typeface="Cabin"/>
               </a:rPr>
               <a:t>lines</a:t>
@@ -27204,61 +27204,61 @@
               <a:buChar char="•"/>
             </a:pPr>
             <a:r>
-              <a:rPr lang="en-US" sz="3600" b="0" i="0" u="none" strike="noStrike" cap="none">
+              <a:rPr lang="en-US" sz="3600" u="none" strike="noStrike" cap="none">
                 <a:solidFill>
                   <a:schemeClr val="lt1"/>
                 </a:solidFill>
-                <a:latin typeface="Cabin"/>
-                <a:ea typeface="Cabin"/>
-                <a:cs typeface="Cabin"/>
+                <a:latin typeface="Arial" charset="0"/>
+                <a:ea typeface="Arial" charset="0"/>
+                <a:cs typeface="Arial" charset="0"/>
                 <a:sym typeface="Cabin"/>
               </a:rPr>
               <a:t>We can look for a string anywhere </a:t>
             </a:r>
             <a:r>
-              <a:rPr lang="en-US" sz="3600" b="0" i="0" u="none" strike="noStrike" cap="none">
+              <a:rPr lang="en-US" sz="3600" u="none" strike="noStrike" cap="none">
                 <a:solidFill>
                   <a:srgbClr val="FFFF00"/>
                 </a:solidFill>
-                <a:latin typeface="Cabin"/>
-                <a:ea typeface="Cabin"/>
-                <a:cs typeface="Cabin"/>
+                <a:latin typeface="Arial" charset="0"/>
+                <a:ea typeface="Arial" charset="0"/>
+                <a:cs typeface="Arial" charset="0"/>
                 <a:sym typeface="Cabin"/>
               </a:rPr>
               <a:t>in</a:t>
             </a:r>
             <a:r>
-              <a:rPr lang="en-US" sz="3600" b="0" i="0" u="none" strike="noStrike" cap="none">
+              <a:rPr lang="en-US" sz="3600" u="none" strike="noStrike" cap="none">
                 <a:solidFill>
                   <a:schemeClr val="lt1"/>
                 </a:solidFill>
-                <a:latin typeface="Cabin"/>
-                <a:ea typeface="Cabin"/>
-                <a:cs typeface="Cabin"/>
+                <a:latin typeface="Arial" charset="0"/>
+                <a:ea typeface="Arial" charset="0"/>
+                <a:cs typeface="Arial" charset="0"/>
                 <a:sym typeface="Cabin"/>
               </a:rPr>
               <a:t> a </a:t>
             </a:r>
             <a:r>
-              <a:rPr lang="en-US" sz="3600" b="0" i="0" u="none" strike="noStrike" cap="none">
+              <a:rPr lang="en-US" sz="3600" u="none" strike="noStrike" cap="none">
                 <a:solidFill>
                   <a:srgbClr val="00FF00"/>
                 </a:solidFill>
-                <a:latin typeface="Cabin"/>
-                <a:ea typeface="Cabin"/>
-                <a:cs typeface="Cabin"/>
+                <a:latin typeface="Arial" charset="0"/>
+                <a:ea typeface="Arial" charset="0"/>
+                <a:cs typeface="Arial" charset="0"/>
                 <a:sym typeface="Cabin"/>
               </a:rPr>
               <a:t>line</a:t>
             </a:r>
             <a:r>
-              <a:rPr lang="en-US" sz="3600" b="0" i="0" u="none" strike="noStrike" cap="none">
+              <a:rPr lang="en-US" sz="3600" u="none" strike="noStrike" cap="none">
                 <a:solidFill>
                   <a:schemeClr val="lt1"/>
                 </a:solidFill>
-                <a:latin typeface="Cabin"/>
-                <a:ea typeface="Cabin"/>
-                <a:cs typeface="Cabin"/>
+                <a:latin typeface="Arial" charset="0"/>
+                <a:ea typeface="Arial" charset="0"/>
+                <a:cs typeface="Arial" charset="0"/>
                 <a:sym typeface="Cabin"/>
               </a:rPr>
               <a:t> as our selection criteria</a:t>
@@ -28260,13 +28260,13 @@
               <a:buNone/>
             </a:pPr>
             <a:r>
-              <a:rPr lang="en-US" sz="3200" b="0" i="0" u="none" strike="noStrike" cap="none">
+              <a:rPr lang="en-US" sz="3200" u="none" strike="noStrike" cap="none">
                 <a:solidFill>
                   <a:srgbClr val="FF00FF"/>
                 </a:solidFill>
-                <a:latin typeface="Cabin"/>
-                <a:ea typeface="Cabin"/>
-                <a:cs typeface="Cabin"/>
+                <a:latin typeface="Arial" charset="0"/>
+                <a:ea typeface="Arial" charset="0"/>
+                <a:cs typeface="Arial" charset="0"/>
                 <a:sym typeface="Cabin"/>
               </a:rPr>
               <a:t>  Software</a:t>
@@ -28323,13 +28323,13 @@
               <a:buNone/>
             </a:pPr>
             <a:r>
-              <a:rPr lang="en-US" sz="3200" b="0" i="0" u="none" strike="noStrike" cap="none">
+              <a:rPr lang="en-US" sz="3200" u="none" strike="noStrike" cap="none">
                 <a:solidFill>
                   <a:schemeClr val="lt1"/>
                 </a:solidFill>
-                <a:latin typeface="Cabin"/>
-                <a:ea typeface="Cabin"/>
-                <a:cs typeface="Cabin"/>
+                <a:latin typeface="Arial" charset="0"/>
+                <a:ea typeface="Arial" charset="0"/>
+                <a:cs typeface="Arial" charset="0"/>
                 <a:sym typeface="Cabin"/>
               </a:rPr>
               <a:t>Input</a:t>
@@ -28354,13 +28354,13 @@
               <a:buNone/>
             </a:pPr>
             <a:r>
-              <a:rPr lang="en-US" sz="3200" b="0" i="0" u="none" strike="noStrike" cap="none">
+              <a:rPr lang="en-US" sz="3200" u="none" strike="noStrike" cap="none">
                 <a:solidFill>
                   <a:schemeClr val="lt1"/>
                 </a:solidFill>
-                <a:latin typeface="Cabin"/>
-                <a:ea typeface="Cabin"/>
-                <a:cs typeface="Cabin"/>
+                <a:latin typeface="Arial" charset="0"/>
+                <a:ea typeface="Arial" charset="0"/>
+                <a:cs typeface="Arial" charset="0"/>
                 <a:sym typeface="Cabin"/>
               </a:rPr>
               <a:t>and Output</a:t>
@@ -28385,13 +28385,13 @@
               <a:buNone/>
             </a:pPr>
             <a:r>
-              <a:rPr lang="en-US" sz="3200" b="0" i="0" u="none" strike="noStrike" cap="none">
+              <a:rPr lang="en-US" sz="3200" u="none" strike="noStrike" cap="none">
                 <a:solidFill>
                   <a:schemeClr val="lt1"/>
                 </a:solidFill>
-                <a:latin typeface="Cabin"/>
-                <a:ea typeface="Cabin"/>
-                <a:cs typeface="Cabin"/>
+                <a:latin typeface="Arial" charset="0"/>
+                <a:ea typeface="Arial" charset="0"/>
+                <a:cs typeface="Arial" charset="0"/>
                 <a:sym typeface="Cabin"/>
               </a:rPr>
               <a:t>Devices</a:t>
@@ -28448,13 +28448,13 @@
               <a:buNone/>
             </a:pPr>
             <a:r>
-              <a:rPr lang="en-US" sz="3200" b="0" i="0" u="none" strike="noStrike" cap="none">
+              <a:rPr lang="en-US" sz="3200" u="none" strike="noStrike" cap="none">
                 <a:solidFill>
                   <a:schemeClr val="lt1"/>
                 </a:solidFill>
-                <a:latin typeface="Cabin"/>
-                <a:ea typeface="Cabin"/>
-                <a:cs typeface="Cabin"/>
+                <a:latin typeface="Arial" charset="0"/>
+                <a:ea typeface="Arial" charset="0"/>
+                <a:cs typeface="Arial" charset="0"/>
                 <a:sym typeface="Cabin"/>
               </a:rPr>
               <a:t>Central</a:t>
@@ -28479,13 +28479,13 @@
               <a:buNone/>
             </a:pPr>
             <a:r>
-              <a:rPr lang="en-US" sz="3200" b="0" i="0" u="none" strike="noStrike" cap="none">
+              <a:rPr lang="en-US" sz="3200" u="none" strike="noStrike" cap="none">
                 <a:solidFill>
                   <a:schemeClr val="lt1"/>
                 </a:solidFill>
-                <a:latin typeface="Cabin"/>
-                <a:ea typeface="Cabin"/>
-                <a:cs typeface="Cabin"/>
+                <a:latin typeface="Arial" charset="0"/>
+                <a:ea typeface="Arial" charset="0"/>
+                <a:cs typeface="Arial" charset="0"/>
                 <a:sym typeface="Cabin"/>
               </a:rPr>
               <a:t>Processing</a:t>
@@ -28510,13 +28510,13 @@
               <a:buNone/>
             </a:pPr>
             <a:r>
-              <a:rPr lang="en-US" sz="3200" b="0" i="0" u="none" strike="noStrike" cap="none">
+              <a:rPr lang="en-US" sz="3200" u="none" strike="noStrike" cap="none">
                 <a:solidFill>
                   <a:schemeClr val="lt1"/>
                 </a:solidFill>
-                <a:latin typeface="Cabin"/>
-                <a:ea typeface="Cabin"/>
-                <a:cs typeface="Cabin"/>
+                <a:latin typeface="Arial" charset="0"/>
+                <a:ea typeface="Arial" charset="0"/>
+                <a:cs typeface="Arial" charset="0"/>
                 <a:sym typeface="Cabin"/>
               </a:rPr>
               <a:t>Unit</a:t>
@@ -28573,13 +28573,13 @@
               <a:buNone/>
             </a:pPr>
             <a:r>
-              <a:rPr lang="en-US" sz="3200" b="0" i="0" u="none" strike="noStrike" cap="none">
+              <a:rPr lang="en-US" sz="3200" u="none" strike="noStrike" cap="none">
                 <a:solidFill>
                   <a:schemeClr val="lt1"/>
                 </a:solidFill>
-                <a:latin typeface="Cabin"/>
-                <a:ea typeface="Cabin"/>
-                <a:cs typeface="Cabin"/>
+                <a:latin typeface="Arial" charset="0"/>
+                <a:ea typeface="Arial" charset="0"/>
+                <a:cs typeface="Arial" charset="0"/>
                 <a:sym typeface="Cabin"/>
               </a:rPr>
               <a:t>Main</a:t>
@@ -28604,13 +28604,13 @@
               <a:buNone/>
             </a:pPr>
             <a:r>
-              <a:rPr lang="en-US" sz="3200" b="0" i="0" u="none" strike="noStrike" cap="none">
+              <a:rPr lang="en-US" sz="3200" u="none" strike="noStrike" cap="none">
                 <a:solidFill>
                   <a:schemeClr val="lt1"/>
                 </a:solidFill>
-                <a:latin typeface="Cabin"/>
-                <a:ea typeface="Cabin"/>
-                <a:cs typeface="Cabin"/>
+                <a:latin typeface="Arial" charset="0"/>
+                <a:ea typeface="Arial" charset="0"/>
+                <a:cs typeface="Arial" charset="0"/>
                 <a:sym typeface="Cabin"/>
               </a:rPr>
               <a:t>Memory</a:t>
@@ -28667,13 +28667,13 @@
               <a:buNone/>
             </a:pPr>
             <a:r>
-              <a:rPr lang="en-US" sz="3200" b="0" i="0" u="none" strike="noStrike" cap="none">
+              <a:rPr lang="en-US" sz="3200" u="none" strike="noStrike" cap="none">
                 <a:solidFill>
                   <a:schemeClr val="lt1"/>
                 </a:solidFill>
-                <a:latin typeface="Cabin"/>
-                <a:ea typeface="Cabin"/>
-                <a:cs typeface="Cabin"/>
+                <a:latin typeface="Arial" charset="0"/>
+                <a:ea typeface="Arial" charset="0"/>
+                <a:cs typeface="Arial" charset="0"/>
                 <a:sym typeface="Cabin"/>
               </a:rPr>
               <a:t>Secondary</a:t>
@@ -28698,13 +28698,13 @@
               <a:buNone/>
             </a:pPr>
             <a:r>
-              <a:rPr lang="en-US" sz="3200" b="0" i="0" u="none" strike="noStrike" cap="none">
+              <a:rPr lang="en-US" sz="3200" u="none" strike="noStrike" cap="none">
                 <a:solidFill>
                   <a:schemeClr val="lt1"/>
                 </a:solidFill>
-                <a:latin typeface="Cabin"/>
-                <a:ea typeface="Cabin"/>
-                <a:cs typeface="Cabin"/>
+                <a:latin typeface="Arial" charset="0"/>
+                <a:ea typeface="Arial" charset="0"/>
+                <a:cs typeface="Arial" charset="0"/>
                 <a:sym typeface="Cabin"/>
               </a:rPr>
               <a:t>Memory</a:t>
@@ -28885,13 +28885,13 @@
               <a:buNone/>
             </a:pPr>
             <a:r>
-              <a:rPr lang="en-US" sz="3600" b="0" i="0" u="none" strike="noStrike" cap="none">
+              <a:rPr lang="en-US" sz="3600" u="none" strike="noStrike" cap="none">
                 <a:solidFill>
                   <a:schemeClr val="lt1"/>
                 </a:solidFill>
-                <a:latin typeface="Cabin"/>
-                <a:ea typeface="Cabin"/>
-                <a:cs typeface="Cabin"/>
+                <a:latin typeface="Arial" charset="0"/>
+                <a:ea typeface="Arial" charset="0"/>
+                <a:cs typeface="Arial" charset="0"/>
                 <a:sym typeface="Cabin"/>
               </a:rPr>
               <a:t>It is time to go find some Data to mess with!</a:t>
@@ -28950,13 +28950,13 @@
               <a:buNone/>
             </a:pPr>
             <a:r>
-              <a:rPr lang="en-US" sz="2600" b="0" i="0" u="none" strike="noStrike" cap="none">
+              <a:rPr lang="en-US" sz="2600" u="none" strike="noStrike" cap="none">
                 <a:solidFill>
                   <a:srgbClr val="000000"/>
                 </a:solidFill>
-                <a:latin typeface="Cabin"/>
-                <a:ea typeface="Cabin"/>
-                <a:cs typeface="Cabin"/>
+                <a:latin typeface="Arial" charset="0"/>
+                <a:ea typeface="Arial" charset="0"/>
+                <a:cs typeface="Arial" charset="0"/>
                 <a:sym typeface="Cabin"/>
               </a:rPr>
               <a:t>What</a:t>
@@ -28981,13 +28981,13 @@
               <a:buNone/>
             </a:pPr>
             <a:r>
-              <a:rPr lang="en-US" sz="2600" b="0" i="0" u="none" strike="noStrike" cap="none">
+              <a:rPr lang="en-US" sz="2600" u="none" strike="noStrike" cap="none">
                 <a:solidFill>
                   <a:srgbClr val="000000"/>
                 </a:solidFill>
-                <a:latin typeface="Cabin"/>
-                <a:ea typeface="Cabin"/>
-                <a:cs typeface="Cabin"/>
+                <a:latin typeface="Arial" charset="0"/>
+                <a:ea typeface="Arial" charset="0"/>
+                <a:cs typeface="Arial" charset="0"/>
                 <a:sym typeface="Cabin"/>
               </a:rPr>
               <a:t>Next?</a:t>
@@ -29076,13 +29076,13 @@
               <a:buNone/>
             </a:pPr>
             <a:r>
-              <a:rPr lang="en-US" sz="2600" b="0" i="0" u="none" strike="noStrike" cap="none">
+              <a:rPr lang="en-US" sz="2600" u="none" strike="noStrike" cap="none">
                 <a:solidFill>
                   <a:srgbClr val="00FF00"/>
                 </a:solidFill>
-                <a:latin typeface="Cabin"/>
-                <a:ea typeface="Cabin"/>
-                <a:cs typeface="Cabin"/>
+                <a:latin typeface="Arial" charset="0"/>
+                <a:ea typeface="Arial" charset="0"/>
+                <a:cs typeface="Arial" charset="0"/>
                 <a:sym typeface="Cabin"/>
               </a:rPr>
               <a:t>if x &lt; 3: print</a:t>
@@ -29139,13 +29139,13 @@
               <a:buNone/>
             </a:pPr>
             <a:r>
-              <a:rPr lang="en-US" sz="1300" b="0" i="0" u="none" strike="noStrike" cap="none">
+              <a:rPr lang="en-US" sz="1300" u="none" strike="noStrike" cap="none">
                 <a:solidFill>
                   <a:srgbClr val="FF00FF"/>
                 </a:solidFill>
-                <a:latin typeface="Cabin"/>
-                <a:ea typeface="Cabin"/>
-                <a:cs typeface="Cabin"/>
+                <a:latin typeface="Arial" charset="0"/>
+                <a:ea typeface="Arial" charset="0"/>
+                <a:cs typeface="Arial" charset="0"/>
                 <a:sym typeface="Cabin"/>
               </a:rPr>
               <a:t>From stephen.marquard@uct.ac.za Sat Jan  5 09:14:16 2008</a:t>
@@ -29170,13 +29170,13 @@
               <a:buNone/>
             </a:pPr>
             <a:r>
-              <a:rPr lang="en-US" sz="1300" b="0" i="0" u="none" strike="noStrike" cap="none">
+              <a:rPr lang="en-US" sz="1300" u="none" strike="noStrike" cap="none">
                 <a:solidFill>
                   <a:srgbClr val="FF00FF"/>
                 </a:solidFill>
-                <a:latin typeface="Cabin"/>
-                <a:ea typeface="Cabin"/>
-                <a:cs typeface="Cabin"/>
+                <a:latin typeface="Arial" charset="0"/>
+                <a:ea typeface="Arial" charset="0"/>
+                <a:cs typeface="Arial" charset="0"/>
                 <a:sym typeface="Cabin"/>
               </a:rPr>
               <a:t>Return-Path: &lt;postmaster@collab.sakaiproject.org&gt;</a:t>
@@ -29201,13 +29201,13 @@
               <a:buNone/>
             </a:pPr>
             <a:r>
-              <a:rPr lang="en-US" sz="1300" b="0" i="0" u="none" strike="noStrike" cap="none">
+              <a:rPr lang="en-US" sz="1300" u="none" strike="noStrike" cap="none">
                 <a:solidFill>
                   <a:srgbClr val="FF00FF"/>
                 </a:solidFill>
-                <a:latin typeface="Cabin"/>
-                <a:ea typeface="Cabin"/>
-                <a:cs typeface="Cabin"/>
+                <a:latin typeface="Arial" charset="0"/>
+                <a:ea typeface="Arial" charset="0"/>
+                <a:cs typeface="Arial" charset="0"/>
                 <a:sym typeface="Cabin"/>
               </a:rPr>
               <a:t>Date: Sat, 5 Jan 2008 09:12:18 -0500To: source@collab.sakaiproject.orgFrom: stephen.marquard@uct.ac.zaSubject: [sakai] svn commit: r39772 - content/branches/Details: http://source.sakaiproject.org/viewsvn/?view=rev&amp;rev=39772</a:t>
@@ -29232,13 +29232,13 @@
               <a:buNone/>
             </a:pPr>
             <a:r>
-              <a:rPr lang="en-US" sz="1300" b="0" i="0" u="none" strike="noStrike" cap="none">
+              <a:rPr lang="en-US" sz="1300" u="none" strike="noStrike" cap="none">
                 <a:solidFill>
                   <a:srgbClr val="FF00FF"/>
                 </a:solidFill>
-                <a:latin typeface="Cabin"/>
-                <a:ea typeface="Cabin"/>
-                <a:cs typeface="Cabin"/>
+                <a:latin typeface="Arial" charset="0"/>
+                <a:ea typeface="Arial" charset="0"/>
+                <a:cs typeface="Arial" charset="0"/>
                 <a:sym typeface="Cabin"/>
               </a:rPr>
               <a:t>...</a:t>
@@ -29297,13 +29297,13 @@
               <a:buNone/>
             </a:pPr>
             <a:r>
-              <a:rPr lang="en-US" sz="2600" b="0" i="0" u="none" strike="noStrike" cap="none">
+              <a:rPr lang="en-US" sz="2600" u="none" strike="noStrike" cap="none">
                 <a:solidFill>
                   <a:srgbClr val="000000"/>
                 </a:solidFill>
-                <a:latin typeface="Cabin"/>
-                <a:ea typeface="Cabin"/>
-                <a:cs typeface="Cabin"/>
+                <a:latin typeface="Arial" charset="0"/>
+                <a:ea typeface="Arial" charset="0"/>
+                <a:cs typeface="Arial" charset="0"/>
                 <a:sym typeface="Cabin"/>
               </a:rPr>
               <a:t>Files R Us</a:t>
@@ -29383,13 +29383,13 @@
               <a:buNone/>
             </a:pPr>
             <a:r>
-              <a:rPr lang="en-US" sz="7600" b="0" i="0" u="none" strike="noStrike" cap="none">
+              <a:rPr lang="en-US" sz="7600" u="none" strike="noStrike" cap="none">
                 <a:solidFill>
                   <a:srgbClr val="FFFF00"/>
                 </a:solidFill>
-                <a:latin typeface="Cabin"/>
-                <a:ea typeface="Cabin"/>
-                <a:cs typeface="Cabin"/>
+                <a:latin typeface="Arial" charset="0"/>
+                <a:ea typeface="Arial" charset="0"/>
+                <a:cs typeface="Arial" charset="0"/>
                 <a:sym typeface="Cabin"/>
               </a:rPr>
               <a:t>Prompt for File Name</a:t>
@@ -30019,25 +30019,25 @@
               <a:buNone/>
             </a:pPr>
             <a:r>
-              <a:rPr lang="en-US" sz="3600" b="0" i="0" u="none" strike="noStrike" cap="none">
+              <a:rPr lang="en-US" sz="3600" u="none" strike="noStrike" cap="none">
                 <a:solidFill>
                   <a:srgbClr val="FF00FF"/>
                 </a:solidFill>
-                <a:latin typeface="Cabin"/>
-                <a:ea typeface="Cabin"/>
-                <a:cs typeface="Cabin"/>
+                <a:latin typeface="Arial" charset="0"/>
+                <a:ea typeface="Arial" charset="0"/>
+                <a:cs typeface="Arial" charset="0"/>
                 <a:sym typeface="Cabin"/>
               </a:rPr>
               <a:t>Enter the file name:  </a:t>
             </a:r>
             <a:r>
-              <a:rPr lang="en-US" sz="3600" b="0" i="0" u="none" strike="noStrike" cap="none">
+              <a:rPr lang="en-US" sz="3600" u="none" strike="noStrike" cap="none">
                 <a:solidFill>
                   <a:srgbClr val="FFFF00"/>
                 </a:solidFill>
-                <a:latin typeface="Cabin"/>
-                <a:ea typeface="Cabin"/>
-                <a:cs typeface="Cabin"/>
+                <a:latin typeface="Arial" charset="0"/>
+                <a:ea typeface="Arial" charset="0"/>
+                <a:cs typeface="Arial" charset="0"/>
                 <a:sym typeface="Cabin"/>
               </a:rPr>
               <a:t>mbox.txt</a:t>
@@ -30062,13 +30062,13 @@
               <a:buNone/>
             </a:pPr>
             <a:r>
-              <a:rPr lang="en-US" sz="3600" b="0" i="0" u="none" strike="noStrike" cap="none">
+              <a:rPr lang="en-US" sz="3600" u="none" strike="noStrike" cap="none">
                 <a:solidFill>
                   <a:srgbClr val="FF00FF"/>
                 </a:solidFill>
-                <a:latin typeface="Cabin"/>
-                <a:ea typeface="Cabin"/>
-                <a:cs typeface="Cabin"/>
+                <a:latin typeface="Arial" charset="0"/>
+                <a:ea typeface="Arial" charset="0"/>
+                <a:cs typeface="Arial" charset="0"/>
                 <a:sym typeface="Cabin"/>
               </a:rPr>
               <a:t>There were 1797 subject lines in mbox.txt</a:t>
@@ -30087,13 +30087,13 @@
               </a:spcAft>
               <a:buNone/>
             </a:pPr>
-            <a:endParaRPr sz="3600" b="0" i="0" u="none" strike="noStrike" cap="none">
+            <a:endParaRPr sz="3600" u="none" strike="noStrike" cap="none">
               <a:solidFill>
                 <a:srgbClr val="FF00FF"/>
               </a:solidFill>
-              <a:latin typeface="Cabin"/>
-              <a:ea typeface="Cabin"/>
-              <a:cs typeface="Cabin"/>
+              <a:latin typeface="Arial" charset="0"/>
+              <a:ea typeface="Arial" charset="0"/>
+              <a:cs typeface="Arial" charset="0"/>
               <a:sym typeface="Cabin"/>
             </a:endParaRPr>
           </a:p>
@@ -30116,25 +30116,25 @@
               <a:buNone/>
             </a:pPr>
             <a:r>
-              <a:rPr lang="en-US" sz="3600" b="0" i="0" u="none" strike="noStrike" cap="none">
+              <a:rPr lang="en-US" sz="3600" u="none" strike="noStrike" cap="none">
                 <a:solidFill>
                   <a:srgbClr val="FF00FF"/>
                 </a:solidFill>
-                <a:latin typeface="Cabin"/>
-                <a:ea typeface="Cabin"/>
-                <a:cs typeface="Cabin"/>
+                <a:latin typeface="Arial" charset="0"/>
+                <a:ea typeface="Arial" charset="0"/>
+                <a:cs typeface="Arial" charset="0"/>
                 <a:sym typeface="Cabin"/>
               </a:rPr>
               <a:t>Enter the file name: </a:t>
             </a:r>
             <a:r>
-              <a:rPr lang="en-US" sz="3600" b="0" i="0" u="none" strike="noStrike" cap="none">
+              <a:rPr lang="en-US" sz="3600" u="none" strike="noStrike" cap="none">
                 <a:solidFill>
                   <a:srgbClr val="FFFF00"/>
                 </a:solidFill>
-                <a:latin typeface="Cabin"/>
-                <a:ea typeface="Cabin"/>
-                <a:cs typeface="Cabin"/>
+                <a:latin typeface="Arial" charset="0"/>
+                <a:ea typeface="Arial" charset="0"/>
+                <a:cs typeface="Arial" charset="0"/>
                 <a:sym typeface="Cabin"/>
               </a:rPr>
               <a:t>mbox-short.txt</a:t>
@@ -30159,13 +30159,13 @@
               <a:buNone/>
             </a:pPr>
             <a:r>
-              <a:rPr lang="en-US" sz="3600" b="0" i="0" u="none" strike="noStrike" cap="none">
+              <a:rPr lang="en-US" sz="3600" u="none" strike="noStrike" cap="none">
                 <a:solidFill>
                   <a:srgbClr val="FF00FF"/>
                 </a:solidFill>
-                <a:latin typeface="Cabin"/>
-                <a:ea typeface="Cabin"/>
-                <a:cs typeface="Cabin"/>
+                <a:latin typeface="Arial" charset="0"/>
+                <a:ea typeface="Arial" charset="0"/>
+                <a:cs typeface="Arial" charset="0"/>
                 <a:sym typeface="Cabin"/>
               </a:rPr>
               <a:t>There were 27 subject lines in mbox-short.txt</a:t>
@@ -30297,13 +30297,13 @@
               <a:buNone/>
             </a:pPr>
             <a:r>
-              <a:rPr lang="en-US" sz="7600" b="0" i="0" u="none" strike="noStrike" cap="none">
+              <a:rPr lang="en-US" sz="7600" u="none" strike="noStrike" cap="none">
                 <a:solidFill>
                   <a:srgbClr val="FFFF00"/>
                 </a:solidFill>
-                <a:latin typeface="Cabin"/>
-                <a:ea typeface="Cabin"/>
-                <a:cs typeface="Cabin"/>
+                <a:latin typeface="Arial" charset="0"/>
+                <a:ea typeface="Arial" charset="0"/>
+                <a:cs typeface="Arial" charset="0"/>
                 <a:sym typeface="Cabin"/>
               </a:rPr>
               <a:t>Bad File Names</a:t>
@@ -31258,25 +31258,25 @@
               <a:buNone/>
             </a:pPr>
             <a:r>
-              <a:rPr lang="en-US" sz="3400" b="0" i="0" u="none" strike="noStrike" cap="none">
+              <a:rPr lang="en-US" sz="3400" u="none" strike="noStrike" cap="none">
                 <a:solidFill>
                   <a:srgbClr val="FF00FF"/>
                 </a:solidFill>
-                <a:latin typeface="Cabin"/>
-                <a:ea typeface="Cabin"/>
-                <a:cs typeface="Cabin"/>
+                <a:latin typeface="Arial" charset="0"/>
+                <a:ea typeface="Arial" charset="0"/>
+                <a:cs typeface="Arial" charset="0"/>
                 <a:sym typeface="Cabin"/>
               </a:rPr>
               <a:t>Enter the file name: </a:t>
             </a:r>
             <a:r>
-              <a:rPr lang="en-US" sz="3400" b="0" i="0" u="none" strike="noStrike" cap="none">
+              <a:rPr lang="en-US" sz="3400" u="none" strike="noStrike" cap="none">
                 <a:solidFill>
                   <a:srgbClr val="FFFF00"/>
                 </a:solidFill>
-                <a:latin typeface="Cabin"/>
-                <a:ea typeface="Cabin"/>
-                <a:cs typeface="Cabin"/>
+                <a:latin typeface="Arial" charset="0"/>
+                <a:ea typeface="Arial" charset="0"/>
+                <a:cs typeface="Arial" charset="0"/>
                 <a:sym typeface="Cabin"/>
               </a:rPr>
               <a:t>mbox.txt</a:t>
@@ -31301,13 +31301,13 @@
               <a:buNone/>
             </a:pPr>
             <a:r>
-              <a:rPr lang="en-US" sz="3400" b="0" i="0" u="none" strike="noStrike" cap="none">
+              <a:rPr lang="en-US" sz="3400" u="none" strike="noStrike" cap="none">
                 <a:solidFill>
                   <a:srgbClr val="FF00FF"/>
                 </a:solidFill>
-                <a:latin typeface="Cabin"/>
-                <a:ea typeface="Cabin"/>
-                <a:cs typeface="Cabin"/>
+                <a:latin typeface="Arial" charset="0"/>
+                <a:ea typeface="Arial" charset="0"/>
+                <a:cs typeface="Arial" charset="0"/>
                 <a:sym typeface="Cabin"/>
               </a:rPr>
               <a:t>There were 1797 subject lines in mbox.txt</a:t>
@@ -31326,13 +31326,13 @@
               </a:spcAft>
               <a:buNone/>
             </a:pPr>
-            <a:endParaRPr sz="3400" b="0" i="0" u="none" strike="noStrike" cap="none">
+            <a:endParaRPr sz="3400" u="none" strike="noStrike" cap="none">
               <a:solidFill>
                 <a:srgbClr val="FF00FF"/>
               </a:solidFill>
-              <a:latin typeface="Cabin"/>
-              <a:ea typeface="Cabin"/>
-              <a:cs typeface="Cabin"/>
+              <a:latin typeface="Arial" charset="0"/>
+              <a:ea typeface="Arial" charset="0"/>
+              <a:cs typeface="Arial" charset="0"/>
               <a:sym typeface="Cabin"/>
             </a:endParaRPr>
           </a:p>
@@ -31355,25 +31355,25 @@
               <a:buNone/>
             </a:pPr>
             <a:r>
-              <a:rPr lang="en-US" sz="3400" b="0" i="0" u="none" strike="noStrike" cap="none">
+              <a:rPr lang="en-US" sz="3400" u="none" strike="noStrike" cap="none">
                 <a:solidFill>
                   <a:srgbClr val="FF00FF"/>
                 </a:solidFill>
-                <a:latin typeface="Cabin"/>
-                <a:ea typeface="Cabin"/>
-                <a:cs typeface="Cabin"/>
+                <a:latin typeface="Arial" charset="0"/>
+                <a:ea typeface="Arial" charset="0"/>
+                <a:cs typeface="Arial" charset="0"/>
                 <a:sym typeface="Cabin"/>
               </a:rPr>
               <a:t>Enter the file name: </a:t>
             </a:r>
             <a:r>
-              <a:rPr lang="en-US" sz="3400" b="0" i="0" u="none" strike="noStrike" cap="none">
+              <a:rPr lang="en-US" sz="3400" u="none" strike="noStrike" cap="none">
                 <a:solidFill>
                   <a:srgbClr val="FFFF00"/>
                 </a:solidFill>
-                <a:latin typeface="Cabin"/>
-                <a:ea typeface="Cabin"/>
-                <a:cs typeface="Cabin"/>
+                <a:latin typeface="Arial" charset="0"/>
+                <a:ea typeface="Arial" charset="0"/>
+                <a:cs typeface="Arial" charset="0"/>
                 <a:sym typeface="Cabin"/>
               </a:rPr>
               <a:t>na na boo boo</a:t>
@@ -31398,13 +31398,13 @@
               <a:buNone/>
             </a:pPr>
             <a:r>
-              <a:rPr lang="en-US" sz="3400" b="0" i="0" u="none" strike="noStrike" cap="none">
+              <a:rPr lang="en-US" sz="3400" u="none" strike="noStrike" cap="none">
                 <a:solidFill>
                   <a:srgbClr val="FF00FF"/>
                 </a:solidFill>
-                <a:latin typeface="Cabin"/>
-                <a:ea typeface="Cabin"/>
-                <a:cs typeface="Cabin"/>
+                <a:latin typeface="Arial" charset="0"/>
+                <a:ea typeface="Arial" charset="0"/>
+                <a:cs typeface="Arial" charset="0"/>
                 <a:sym typeface="Cabin"/>
               </a:rPr>
               <a:t>File cannot be opened: na na boo boo</a:t>
@@ -31484,13 +31484,13 @@
               <a:buNone/>
             </a:pPr>
             <a:r>
-              <a:rPr lang="en-US" sz="7600" b="0" i="0" u="none" strike="noStrike" cap="none">
+              <a:rPr lang="en-US" sz="7600" u="none" strike="noStrike" cap="none">
                 <a:solidFill>
                   <a:srgbClr val="FFFF00"/>
                 </a:solidFill>
-                <a:latin typeface="Cabin"/>
-                <a:ea typeface="Cabin"/>
-                <a:cs typeface="Cabin"/>
+                <a:latin typeface="Arial" charset="0"/>
+                <a:ea typeface="Arial" charset="0"/>
+                <a:cs typeface="Arial" charset="0"/>
                 <a:sym typeface="Cabin"/>
               </a:rPr>
               <a:t>Summary</a:t>
@@ -31545,13 +31545,13 @@
               <a:buChar char="•"/>
             </a:pPr>
             <a:r>
-              <a:rPr lang="en-US" sz="3600" b="0" i="0" u="none" strike="noStrike" cap="none">
+              <a:rPr lang="en-US" sz="3600" u="none" strike="noStrike" cap="none">
                 <a:solidFill>
                   <a:schemeClr val="lt1"/>
                 </a:solidFill>
-                <a:latin typeface="Cabin"/>
-                <a:ea typeface="Cabin"/>
-                <a:cs typeface="Cabin"/>
+                <a:latin typeface="Arial" charset="0"/>
+                <a:ea typeface="Arial" charset="0"/>
+                <a:cs typeface="Arial" charset="0"/>
                 <a:sym typeface="Cabin"/>
               </a:rPr>
               <a:t>Secondary storage</a:t>
@@ -31576,13 +31576,13 @@
               <a:buChar char="•"/>
             </a:pPr>
             <a:r>
-              <a:rPr lang="en-US" sz="3600" b="0" i="0" u="none" strike="noStrike" cap="none">
+              <a:rPr lang="en-US" sz="3600" u="none" strike="noStrike" cap="none">
                 <a:solidFill>
                   <a:schemeClr val="lt1"/>
                 </a:solidFill>
-                <a:latin typeface="Cabin"/>
-                <a:ea typeface="Cabin"/>
-                <a:cs typeface="Cabin"/>
+                <a:latin typeface="Arial" charset="0"/>
+                <a:ea typeface="Arial" charset="0"/>
+                <a:cs typeface="Arial" charset="0"/>
                 <a:sym typeface="Cabin"/>
               </a:rPr>
               <a:t>Opening a file - file handle</a:t>
@@ -31607,13 +31607,13 @@
               <a:buChar char="•"/>
             </a:pPr>
             <a:r>
-              <a:rPr lang="en-US" sz="3600" b="0" i="0" u="none" strike="noStrike" cap="none">
+              <a:rPr lang="en-US" sz="3600" u="none" strike="noStrike" cap="none">
                 <a:solidFill>
                   <a:schemeClr val="lt1"/>
                 </a:solidFill>
-                <a:latin typeface="Cabin"/>
-                <a:ea typeface="Cabin"/>
-                <a:cs typeface="Cabin"/>
+                <a:latin typeface="Arial" charset="0"/>
+                <a:ea typeface="Arial" charset="0"/>
+                <a:cs typeface="Arial" charset="0"/>
                 <a:sym typeface="Cabin"/>
               </a:rPr>
               <a:t>File structure - newline character</a:t>
@@ -31638,13 +31638,13 @@
               <a:buChar char="•"/>
             </a:pPr>
             <a:r>
-              <a:rPr lang="en-US" sz="3600" b="0" i="0" u="none" strike="noStrike" cap="none">
+              <a:rPr lang="en-US" sz="3600" u="none" strike="noStrike" cap="none">
                 <a:solidFill>
                   <a:schemeClr val="lt1"/>
                 </a:solidFill>
-                <a:latin typeface="Cabin"/>
-                <a:ea typeface="Cabin"/>
-                <a:cs typeface="Cabin"/>
+                <a:latin typeface="Arial" charset="0"/>
+                <a:ea typeface="Arial" charset="0"/>
+                <a:cs typeface="Arial" charset="0"/>
                 <a:sym typeface="Cabin"/>
               </a:rPr>
               <a:t>Reading a file line</a:t>
@@ -31654,21 +31654,21 @@
                 <a:solidFill>
                   <a:schemeClr val="lt1"/>
                 </a:solidFill>
-                <a:latin typeface="Cabin"/>
-                <a:ea typeface="Cabin"/>
-                <a:cs typeface="Cabin"/>
+                <a:latin typeface="Arial" charset="0"/>
+                <a:ea typeface="Arial" charset="0"/>
+                <a:cs typeface="Arial" charset="0"/>
                 <a:sym typeface="Cabin"/>
               </a:rPr>
               <a:t> </a:t>
             </a:r>
             <a:r>
-              <a:rPr lang="en-US" sz="3600" b="0" i="0" u="none" strike="noStrike" cap="none">
+              <a:rPr lang="en-US" sz="3600" u="none" strike="noStrike" cap="none">
                 <a:solidFill>
                   <a:schemeClr val="lt1"/>
                 </a:solidFill>
-                <a:latin typeface="Cabin"/>
-                <a:ea typeface="Cabin"/>
-                <a:cs typeface="Cabin"/>
+                <a:latin typeface="Arial" charset="0"/>
+                <a:ea typeface="Arial" charset="0"/>
+                <a:cs typeface="Arial" charset="0"/>
                 <a:sym typeface="Cabin"/>
               </a:rPr>
               <a:t>by</a:t>
@@ -31678,44 +31678,44 @@
                 <a:solidFill>
                   <a:schemeClr val="lt1"/>
                 </a:solidFill>
-                <a:latin typeface="Cabin"/>
-                <a:ea typeface="Cabin"/>
-                <a:cs typeface="Cabin"/>
+                <a:latin typeface="Arial" charset="0"/>
+                <a:ea typeface="Arial" charset="0"/>
+                <a:cs typeface="Arial" charset="0"/>
                 <a:sym typeface="Cabin"/>
               </a:rPr>
               <a:t> </a:t>
             </a:r>
             <a:r>
-              <a:rPr lang="en-US" sz="3600" b="0" i="0" u="none" strike="noStrike" cap="none">
+              <a:rPr lang="en-US" sz="3600" u="none" strike="noStrike" cap="none">
                 <a:solidFill>
                   <a:schemeClr val="lt1"/>
                 </a:solidFill>
-                <a:latin typeface="Cabin"/>
-                <a:ea typeface="Cabin"/>
-                <a:cs typeface="Cabin"/>
+                <a:latin typeface="Arial" charset="0"/>
+                <a:ea typeface="Arial" charset="0"/>
+                <a:cs typeface="Arial" charset="0"/>
                 <a:sym typeface="Cabin"/>
               </a:rPr>
               <a:t>line with a </a:t>
             </a:r>
             <a:br>
-              <a:rPr lang="en-US" sz="3600" b="0" i="0" u="none" strike="noStrike" cap="none">
+              <a:rPr lang="en-US" sz="3600" u="none" strike="noStrike" cap="none">
                 <a:solidFill>
                   <a:schemeClr val="lt1"/>
                 </a:solidFill>
-                <a:latin typeface="Cabin"/>
-                <a:ea typeface="Cabin"/>
-                <a:cs typeface="Cabin"/>
+                <a:latin typeface="Arial" charset="0"/>
+                <a:ea typeface="Arial" charset="0"/>
+                <a:cs typeface="Arial" charset="0"/>
                 <a:sym typeface="Cabin"/>
               </a:rPr>
             </a:br>
             <a:r>
-              <a:rPr lang="en-US" sz="3600" b="0" i="0" u="none" strike="noStrike" cap="none">
+              <a:rPr lang="en-US" sz="3600" u="none" strike="noStrike" cap="none">
                 <a:solidFill>
                   <a:schemeClr val="lt1"/>
                 </a:solidFill>
-                <a:latin typeface="Cabin"/>
-                <a:ea typeface="Cabin"/>
-                <a:cs typeface="Cabin"/>
+                <a:latin typeface="Arial" charset="0"/>
+                <a:ea typeface="Arial" charset="0"/>
+                <a:cs typeface="Arial" charset="0"/>
                 <a:sym typeface="Cabin"/>
               </a:rPr>
               <a:t>for loop</a:t>
@@ -31770,13 +31770,13 @@
               <a:buChar char="•"/>
             </a:pPr>
             <a:r>
-              <a:rPr lang="en-US" sz="3600" b="0" i="0" u="none" strike="noStrike" cap="none">
+              <a:rPr lang="en-US" sz="3600" u="none" strike="noStrike" cap="none">
                 <a:solidFill>
                   <a:schemeClr val="lt1"/>
                 </a:solidFill>
-                <a:latin typeface="Cabin"/>
-                <a:ea typeface="Cabin"/>
-                <a:cs typeface="Cabin"/>
+                <a:latin typeface="Arial" charset="0"/>
+                <a:ea typeface="Arial" charset="0"/>
+                <a:cs typeface="Arial" charset="0"/>
                 <a:sym typeface="Cabin"/>
               </a:rPr>
               <a:t>Searching for lines</a:t>
@@ -31801,13 +31801,13 @@
               <a:buChar char="•"/>
             </a:pPr>
             <a:r>
-              <a:rPr lang="en-US" sz="3600" b="0" i="0" u="none" strike="noStrike" cap="none">
+              <a:rPr lang="en-US" sz="3600" u="none" strike="noStrike" cap="none">
                 <a:solidFill>
                   <a:schemeClr val="lt1"/>
                 </a:solidFill>
-                <a:latin typeface="Cabin"/>
-                <a:ea typeface="Cabin"/>
-                <a:cs typeface="Cabin"/>
+                <a:latin typeface="Arial" charset="0"/>
+                <a:ea typeface="Arial" charset="0"/>
+                <a:cs typeface="Arial" charset="0"/>
                 <a:sym typeface="Cabin"/>
               </a:rPr>
               <a:t>Reading file names</a:t>
@@ -31832,13 +31832,13 @@
               <a:buChar char="•"/>
             </a:pPr>
             <a:r>
-              <a:rPr lang="en-US" sz="3600" b="0" i="0" u="none" strike="noStrike" cap="none">
+              <a:rPr lang="en-US" sz="3600" u="none" strike="noStrike" cap="none">
                 <a:solidFill>
                   <a:schemeClr val="lt1"/>
                 </a:solidFill>
-                <a:latin typeface="Cabin"/>
-                <a:ea typeface="Cabin"/>
-                <a:cs typeface="Cabin"/>
+                <a:latin typeface="Arial" charset="0"/>
+                <a:ea typeface="Arial" charset="0"/>
+                <a:cs typeface="Arial" charset="0"/>
                 <a:sym typeface="Cabin"/>
               </a:rPr>
               <a:t>Dealing with bad files</a:t>
@@ -32215,13 +32215,13 @@
               <a:buNone/>
             </a:pPr>
             <a:r>
-              <a:rPr lang="en-US" sz="7600" b="0" i="0" u="none" strike="noStrike" cap="none">
+              <a:rPr lang="en-US" sz="7600" u="none" strike="noStrike" cap="none">
                 <a:solidFill>
                   <a:srgbClr val="FFFF00"/>
                 </a:solidFill>
-                <a:latin typeface="Cabin"/>
-                <a:ea typeface="Cabin"/>
-                <a:cs typeface="Cabin"/>
+                <a:latin typeface="Arial" charset="0"/>
+                <a:ea typeface="Arial" charset="0"/>
+                <a:cs typeface="Arial" charset="0"/>
                 <a:sym typeface="Cabin"/>
               </a:rPr>
               <a:t>File Processing</a:t>
@@ -32272,13 +32272,13 @@
               <a:buFont typeface="Cabin"/>
             </a:pPr>
             <a:r>
-              <a:rPr lang="en-US" sz="3600" b="0" i="0" u="none" strike="noStrike" cap="none">
+              <a:rPr lang="en-US" sz="3600" u="none" strike="noStrike" cap="none">
                 <a:solidFill>
                   <a:schemeClr val="lt1"/>
                 </a:solidFill>
-                <a:latin typeface="Cabin"/>
-                <a:ea typeface="Cabin"/>
-                <a:cs typeface="Cabin"/>
+                <a:latin typeface="Arial" charset="0"/>
+                <a:ea typeface="Arial" charset="0"/>
+                <a:cs typeface="Arial" charset="0"/>
                 <a:sym typeface="Cabin"/>
               </a:rPr>
               <a:t>A text file can be thought of as a sequence of lines</a:t>
@@ -32623,13 +32623,13 @@
               <a:buNone/>
             </a:pPr>
             <a:r>
-              <a:rPr lang="en-US" sz="3000" b="0" i="0" u="sng" strike="noStrike" cap="none">
+              <a:rPr lang="en-US" sz="3000" u="sng" strike="noStrike" cap="none">
                 <a:solidFill>
                   <a:srgbClr val="FFFF00"/>
                 </a:solidFill>
-                <a:latin typeface="Cabin"/>
-                <a:ea typeface="Cabin"/>
-                <a:cs typeface="Cabin"/>
+                <a:latin typeface="Arial" charset="0"/>
+                <a:ea typeface="Arial" charset="0"/>
+                <a:cs typeface="Arial" charset="0"/>
                 <a:sym typeface="Cabin"/>
                 <a:hlinkClick r:id="rId3"/>
               </a:rPr>
@@ -32710,13 +32710,13 @@
               <a:buNone/>
             </a:pPr>
             <a:r>
-              <a:rPr lang="en-US" sz="7600" b="0" i="0" u="none" strike="noStrike" cap="none">
+              <a:rPr lang="en-US" sz="7600" u="none" strike="noStrike" cap="none">
                 <a:solidFill>
                   <a:srgbClr val="FFFF00"/>
                 </a:solidFill>
-                <a:latin typeface="Cabin"/>
-                <a:ea typeface="Cabin"/>
-                <a:cs typeface="Cabin"/>
+                <a:latin typeface="Arial" charset="0"/>
+                <a:ea typeface="Arial" charset="0"/>
+                <a:cs typeface="Arial" charset="0"/>
                 <a:sym typeface="Cabin"/>
               </a:rPr>
               <a:t>Opening a File</a:t>
@@ -32771,13 +32771,13 @@
               <a:buChar char="•"/>
             </a:pPr>
             <a:r>
-              <a:rPr lang="en-US" sz="3600" b="0" i="0" u="none" strike="noStrike" cap="none">
+              <a:rPr lang="en-US" sz="3600" u="none" strike="noStrike" cap="none">
                 <a:solidFill>
                   <a:schemeClr val="lt1"/>
                 </a:solidFill>
-                <a:latin typeface="Cabin"/>
-                <a:ea typeface="Cabin"/>
-                <a:cs typeface="Cabin"/>
+                <a:latin typeface="Arial" charset="0"/>
+                <a:ea typeface="Arial" charset="0"/>
+                <a:cs typeface="Arial" charset="0"/>
                 <a:sym typeface="Cabin"/>
               </a:rPr>
               <a:t>Before we can read the contents of the file, we must tell Python which file we are going to work with and what we will be doing with the file</a:t>
@@ -32802,37 +32802,37 @@
               <a:buChar char="•"/>
             </a:pPr>
             <a:r>
-              <a:rPr lang="en-US" sz="3600" b="0" i="0" u="none" strike="noStrike" cap="none">
+              <a:rPr lang="en-US" sz="3600" u="none" strike="noStrike" cap="none">
                 <a:solidFill>
                   <a:schemeClr val="lt1"/>
                 </a:solidFill>
-                <a:latin typeface="Cabin"/>
-                <a:ea typeface="Cabin"/>
-                <a:cs typeface="Cabin"/>
+                <a:latin typeface="Arial" charset="0"/>
+                <a:ea typeface="Arial" charset="0"/>
+                <a:cs typeface="Arial" charset="0"/>
                 <a:sym typeface="Cabin"/>
               </a:rPr>
               <a:t>This is done with the </a:t>
             </a:r>
             <a:r>
-              <a:rPr lang="en-US" sz="3600" b="0" i="0" u="none" strike="noStrike" cap="none">
+              <a:rPr lang="en-US" sz="3600" u="none" strike="noStrike" cap="none">
                 <a:solidFill>
                   <a:srgbClr val="FF00FF"/>
                 </a:solidFill>
-                <a:latin typeface="Cabin"/>
-                <a:ea typeface="Cabin"/>
-                <a:cs typeface="Cabin"/>
+                <a:latin typeface="Arial" charset="0"/>
+                <a:ea typeface="Arial" charset="0"/>
+                <a:cs typeface="Arial" charset="0"/>
                 <a:sym typeface="Cabin"/>
               </a:rPr>
               <a:t>open</a:t>
             </a:r>
             <a:r>
-              <a:rPr lang="en-US" sz="3600" b="0" i="0" u="none" strike="noStrike" cap="none">
+              <a:rPr lang="en-US" sz="3600" u="none" strike="noStrike" cap="none">
                 <a:solidFill>
                   <a:schemeClr val="lt1"/>
                 </a:solidFill>
-                <a:latin typeface="Cabin"/>
-                <a:ea typeface="Cabin"/>
-                <a:cs typeface="Cabin"/>
+                <a:latin typeface="Arial" charset="0"/>
+                <a:ea typeface="Arial" charset="0"/>
+                <a:cs typeface="Arial" charset="0"/>
                 <a:sym typeface="Cabin"/>
               </a:rPr>
               <a:t>() function</a:t>
@@ -32857,25 +32857,25 @@
               <a:buChar char="•"/>
             </a:pPr>
             <a:r>
-              <a:rPr lang="en-US" sz="3600" b="0" i="0" u="none" strike="noStrike" cap="none">
+              <a:rPr lang="en-US" sz="3600" u="none" strike="noStrike" cap="none">
                 <a:solidFill>
                   <a:srgbClr val="FF00FF"/>
                 </a:solidFill>
-                <a:latin typeface="Cabin"/>
-                <a:ea typeface="Cabin"/>
-                <a:cs typeface="Cabin"/>
+                <a:latin typeface="Arial" charset="0"/>
+                <a:ea typeface="Arial" charset="0"/>
+                <a:cs typeface="Arial" charset="0"/>
                 <a:sym typeface="Cabin"/>
               </a:rPr>
               <a:t>open</a:t>
             </a:r>
             <a:r>
-              <a:rPr lang="en-US" sz="3600" b="0" i="0" u="none" strike="noStrike" cap="none">
+              <a:rPr lang="en-US" sz="3600" u="none" strike="noStrike" cap="none">
                 <a:solidFill>
                   <a:schemeClr val="lt1"/>
                 </a:solidFill>
-                <a:latin typeface="Cabin"/>
-                <a:ea typeface="Cabin"/>
-                <a:cs typeface="Cabin"/>
+                <a:latin typeface="Arial" charset="0"/>
+                <a:ea typeface="Arial" charset="0"/>
+                <a:cs typeface="Arial" charset="0"/>
                 <a:sym typeface="Cabin"/>
               </a:rPr>
               <a:t>() returns a </a:t>
@@ -32893,13 +32893,13 @@
               <a:t>“</a:t>
             </a:r>
             <a:r>
-              <a:rPr lang="en-US" sz="3600" b="0" i="0" u="none" strike="noStrike" cap="none">
+              <a:rPr lang="en-US" sz="3600" u="none" strike="noStrike" cap="none">
                 <a:solidFill>
                   <a:srgbClr val="FF7F00"/>
                 </a:solidFill>
-                <a:latin typeface="Cabin"/>
-                <a:ea typeface="Cabin"/>
-                <a:cs typeface="Cabin"/>
+                <a:latin typeface="Arial" charset="0"/>
+                <a:ea typeface="Arial" charset="0"/>
+                <a:cs typeface="Arial" charset="0"/>
                 <a:sym typeface="Cabin"/>
               </a:rPr>
               <a:t>file handle</a:t>
@@ -32917,13 +32917,13 @@
               <a:t>”</a:t>
             </a:r>
             <a:r>
-              <a:rPr lang="en-US" sz="3600" b="0" i="0" u="none" strike="noStrike" cap="none">
+              <a:rPr lang="en-US" sz="3600" u="none" strike="noStrike" cap="none">
                 <a:solidFill>
                   <a:schemeClr val="lt1"/>
                 </a:solidFill>
-                <a:latin typeface="Cabin"/>
-                <a:ea typeface="Cabin"/>
-                <a:cs typeface="Cabin"/>
+                <a:latin typeface="Arial" charset="0"/>
+                <a:ea typeface="Arial" charset="0"/>
+                <a:cs typeface="Arial" charset="0"/>
                 <a:sym typeface="Cabin"/>
               </a:rPr>
               <a:t> - a variable used to perform operations on the file</a:t>
@@ -32952,21 +32952,21 @@
                 <a:solidFill>
                   <a:schemeClr val="lt1"/>
                 </a:solidFill>
-                <a:latin typeface="Cabin"/>
-                <a:ea typeface="Cabin"/>
-                <a:cs typeface="Cabin"/>
+                <a:latin typeface="Arial" charset="0"/>
+                <a:ea typeface="Arial" charset="0"/>
+                <a:cs typeface="Arial" charset="0"/>
                 <a:sym typeface="Cabin"/>
               </a:rPr>
               <a:t>Similar to</a:t>
             </a:r>
             <a:r>
-              <a:rPr lang="en-US" sz="3600" b="0" i="0" u="none" strike="noStrike" cap="none">
+              <a:rPr lang="en-US" sz="3600" u="none" strike="noStrike" cap="none">
                 <a:solidFill>
                   <a:schemeClr val="lt1"/>
                 </a:solidFill>
-                <a:latin typeface="Cabin"/>
-                <a:ea typeface="Cabin"/>
-                <a:cs typeface="Cabin"/>
+                <a:latin typeface="Arial" charset="0"/>
+                <a:ea typeface="Arial" charset="0"/>
+                <a:cs typeface="Arial" charset="0"/>
                 <a:sym typeface="Cabin"/>
               </a:rPr>
               <a:t> </a:t>
@@ -32984,13 +32984,13 @@
               <a:t>“</a:t>
             </a:r>
             <a:r>
-              <a:rPr lang="en-US" sz="3600" b="0" i="0" u="none" strike="noStrike" cap="none">
+              <a:rPr lang="en-US" sz="3600" u="none" strike="noStrike" cap="none">
                 <a:solidFill>
                   <a:schemeClr val="lt1"/>
                 </a:solidFill>
-                <a:latin typeface="Cabin"/>
-                <a:ea typeface="Cabin"/>
-                <a:cs typeface="Cabin"/>
+                <a:latin typeface="Arial" charset="0"/>
+                <a:ea typeface="Arial" charset="0"/>
+                <a:cs typeface="Arial" charset="0"/>
                 <a:sym typeface="Cabin"/>
               </a:rPr>
               <a:t>File -&gt; Open</a:t>
@@ -33008,13 +33008,13 @@
               <a:t>”</a:t>
             </a:r>
             <a:r>
-              <a:rPr lang="en-US" sz="3600" b="0" i="0" u="none" strike="noStrike" cap="none">
+              <a:rPr lang="en-US" sz="3600" u="none" strike="noStrike" cap="none">
                 <a:solidFill>
                   <a:schemeClr val="lt1"/>
                 </a:solidFill>
-                <a:latin typeface="Cabin"/>
-                <a:ea typeface="Cabin"/>
-                <a:cs typeface="Cabin"/>
+                <a:latin typeface="Arial" charset="0"/>
+                <a:ea typeface="Arial" charset="0"/>
+                <a:cs typeface="Arial" charset="0"/>
                 <a:sym typeface="Cabin"/>
               </a:rPr>
               <a:t> in a Word Processor</a:t>
@@ -33094,13 +33094,13 @@
               <a:buNone/>
             </a:pPr>
             <a:r>
-              <a:rPr lang="en-US" sz="7600" b="0" i="0" u="none" strike="noStrike" cap="none">
+              <a:rPr lang="en-US" sz="7600" u="none" strike="noStrike" cap="none">
                 <a:solidFill>
                   <a:srgbClr val="FFFF00"/>
                 </a:solidFill>
-                <a:latin typeface="Cabin"/>
-                <a:ea typeface="Cabin"/>
-                <a:cs typeface="Cabin"/>
+                <a:latin typeface="Arial" charset="0"/>
+                <a:ea typeface="Arial" charset="0"/>
+                <a:cs typeface="Arial" charset="0"/>
                 <a:sym typeface="Cabin"/>
               </a:rPr>
               <a:t>Using open()</a:t>
@@ -33155,97 +33155,97 @@
               <a:buChar char="•"/>
             </a:pPr>
             <a:r>
-              <a:rPr lang="en-US" sz="3600" b="0" i="0" u="none" strike="noStrike" cap="none">
+              <a:rPr lang="en-US" sz="3600" u="none" strike="noStrike" cap="none">
                 <a:solidFill>
                   <a:srgbClr val="FF7F00"/>
                 </a:solidFill>
-                <a:latin typeface="Cabin"/>
-                <a:ea typeface="Cabin"/>
-                <a:cs typeface="Cabin"/>
+                <a:latin typeface="Arial" charset="0"/>
+                <a:ea typeface="Arial" charset="0"/>
+                <a:cs typeface="Arial" charset="0"/>
                 <a:sym typeface="Cabin"/>
               </a:rPr>
               <a:t>handle</a:t>
             </a:r>
             <a:r>
-              <a:rPr lang="en-US" sz="3600" b="0" i="0" u="none" strike="noStrike" cap="none">
+              <a:rPr lang="en-US" sz="3600" u="none" strike="noStrike" cap="none">
                 <a:solidFill>
                   <a:schemeClr val="lt1"/>
                 </a:solidFill>
-                <a:latin typeface="Cabin"/>
-                <a:ea typeface="Cabin"/>
-                <a:cs typeface="Cabin"/>
+                <a:latin typeface="Arial" charset="0"/>
+                <a:ea typeface="Arial" charset="0"/>
+                <a:cs typeface="Arial" charset="0"/>
                 <a:sym typeface="Cabin"/>
               </a:rPr>
               <a:t> = </a:t>
             </a:r>
             <a:r>
-              <a:rPr lang="en-US" sz="3600" b="0" i="0" u="none" strike="noStrike" cap="none">
+              <a:rPr lang="en-US" sz="3600" u="none" strike="noStrike" cap="none">
                 <a:solidFill>
                   <a:srgbClr val="FF00FF"/>
                 </a:solidFill>
-                <a:latin typeface="Cabin"/>
-                <a:ea typeface="Cabin"/>
-                <a:cs typeface="Cabin"/>
+                <a:latin typeface="Arial" charset="0"/>
+                <a:ea typeface="Arial" charset="0"/>
+                <a:cs typeface="Arial" charset="0"/>
                 <a:sym typeface="Cabin"/>
               </a:rPr>
               <a:t>open</a:t>
             </a:r>
             <a:r>
-              <a:rPr lang="en-US" sz="3600" b="0" i="0" u="none" strike="noStrike" cap="none">
+              <a:rPr lang="en-US" sz="3600" u="none" strike="noStrike" cap="none">
                 <a:solidFill>
                   <a:schemeClr val="lt1"/>
                 </a:solidFill>
-                <a:latin typeface="Cabin"/>
-                <a:ea typeface="Cabin"/>
-                <a:cs typeface="Cabin"/>
+                <a:latin typeface="Arial" charset="0"/>
+                <a:ea typeface="Arial" charset="0"/>
+                <a:cs typeface="Arial" charset="0"/>
                 <a:sym typeface="Cabin"/>
               </a:rPr>
               <a:t>(</a:t>
             </a:r>
             <a:r>
-              <a:rPr lang="en-US" sz="3600" b="0" i="0" u="none" strike="noStrike" cap="none">
+              <a:rPr lang="en-US" sz="3600" u="none" strike="noStrike" cap="none">
                 <a:solidFill>
                   <a:srgbClr val="00FFFF"/>
                 </a:solidFill>
-                <a:latin typeface="Cabin"/>
-                <a:ea typeface="Cabin"/>
-                <a:cs typeface="Cabin"/>
+                <a:latin typeface="Arial" charset="0"/>
+                <a:ea typeface="Arial" charset="0"/>
+                <a:cs typeface="Arial" charset="0"/>
                 <a:sym typeface="Cabin"/>
               </a:rPr>
               <a:t>filename</a:t>
             </a:r>
             <a:r>
-              <a:rPr lang="en-US" sz="3600" b="0" i="0" u="none" strike="noStrike" cap="none">
+              <a:rPr lang="en-US" sz="3600" u="none" strike="noStrike" cap="none">
                 <a:solidFill>
                   <a:schemeClr val="lt1"/>
                 </a:solidFill>
-                <a:latin typeface="Cabin"/>
-                <a:ea typeface="Cabin"/>
-                <a:cs typeface="Cabin"/>
+                <a:latin typeface="Arial" charset="0"/>
+                <a:ea typeface="Arial" charset="0"/>
+                <a:cs typeface="Arial" charset="0"/>
                 <a:sym typeface="Cabin"/>
               </a:rPr>
               <a:t>, </a:t>
             </a:r>
             <a:r>
-              <a:rPr lang="en-US" sz="3600" b="0" i="0" u="none" strike="noStrike" cap="none">
+              <a:rPr lang="en-US" sz="3600" u="none" strike="noStrike" cap="none">
                 <a:solidFill>
                   <a:srgbClr val="FFFF00"/>
                 </a:solidFill>
-                <a:latin typeface="Cabin"/>
-                <a:ea typeface="Cabin"/>
-                <a:cs typeface="Cabin"/>
+                <a:latin typeface="Arial" charset="0"/>
+                <a:ea typeface="Arial" charset="0"/>
+                <a:cs typeface="Arial" charset="0"/>
                 <a:sym typeface="Cabin"/>
               </a:rPr>
               <a:t>mode</a:t>
             </a:r>
             <a:r>
-              <a:rPr lang="en-US" sz="3600" b="0" i="0" u="none" strike="noStrike" cap="none">
+              <a:rPr lang="en-US" sz="3600" u="none" strike="noStrike" cap="none">
                 <a:solidFill>
                   <a:schemeClr val="lt1"/>
                 </a:solidFill>
-                <a:latin typeface="Cabin"/>
-                <a:ea typeface="Cabin"/>
-                <a:cs typeface="Cabin"/>
+                <a:latin typeface="Arial" charset="0"/>
+                <a:ea typeface="Arial" charset="0"/>
+                <a:cs typeface="Arial" charset="0"/>
                 <a:sym typeface="Cabin"/>
               </a:rPr>
               <a:t>)</a:t>
@@ -33269,13 +33269,13 @@
               <a:buFont typeface="Cabin"/>
             </a:pPr>
             <a:r>
-              <a:rPr lang="en-US" sz="3600" b="0" i="0" u="none" strike="noStrike" cap="none">
+              <a:rPr lang="en-US" sz="3600" u="none" strike="noStrike" cap="none">
                 <a:solidFill>
                   <a:srgbClr val="FF7F00"/>
                 </a:solidFill>
-                <a:latin typeface="Cabin"/>
-                <a:ea typeface="Cabin"/>
-                <a:cs typeface="Cabin"/>
+                <a:latin typeface="Arial" charset="0"/>
+                <a:ea typeface="Arial" charset="0"/>
+                <a:cs typeface="Arial" charset="0"/>
                 <a:sym typeface="Cabin"/>
               </a:rPr>
               <a:t>returns a handle use to manipulate the file</a:t>
@@ -33299,13 +33299,13 @@
               <a:buFont typeface="Cabin"/>
             </a:pPr>
             <a:r>
-              <a:rPr lang="en-US" sz="3600" b="0" i="0" u="none" strike="noStrike" cap="none">
+              <a:rPr lang="en-US" sz="3600" u="none" strike="noStrike" cap="none">
                 <a:solidFill>
                   <a:srgbClr val="00FFFF"/>
                 </a:solidFill>
-                <a:latin typeface="Cabin"/>
-                <a:ea typeface="Cabin"/>
-                <a:cs typeface="Cabin"/>
+                <a:latin typeface="Arial" charset="0"/>
+                <a:ea typeface="Arial" charset="0"/>
+                <a:cs typeface="Arial" charset="0"/>
                 <a:sym typeface="Cabin"/>
               </a:rPr>
               <a:t>filename is a string</a:t>
@@ -33329,13 +33329,13 @@
               <a:buFont typeface="Cabin"/>
             </a:pPr>
             <a:r>
-              <a:rPr lang="en-US" sz="3600" b="0" i="0" u="none" strike="noStrike" cap="none">
+              <a:rPr lang="en-US" sz="3600" u="none" strike="noStrike" cap="none">
                 <a:solidFill>
                   <a:srgbClr val="FFFF00"/>
                 </a:solidFill>
-                <a:latin typeface="Cabin"/>
-                <a:ea typeface="Cabin"/>
-                <a:cs typeface="Cabin"/>
+                <a:latin typeface="Arial" charset="0"/>
+                <a:ea typeface="Arial" charset="0"/>
+                <a:cs typeface="Arial" charset="0"/>
                 <a:sym typeface="Cabin"/>
               </a:rPr>
               <a:t>mode is optional and should be 'r' if we are planning to read the file and 'w' if we are going to write to the file</a:t>
@@ -33386,97 +33386,97 @@
               <a:buNone/>
             </a:pPr>
             <a:r>
-              <a:rPr lang="en-US" sz="3600" b="0" i="0" u="none" strike="noStrike" cap="none">
+              <a:rPr lang="en-US" sz="3600" u="none" strike="noStrike" cap="none">
                 <a:solidFill>
                   <a:srgbClr val="FF7F00"/>
                 </a:solidFill>
-                <a:latin typeface="Cabin"/>
-                <a:ea typeface="Cabin"/>
-                <a:cs typeface="Cabin"/>
+                <a:latin typeface="Arial" charset="0"/>
+                <a:ea typeface="Arial" charset="0"/>
+                <a:cs typeface="Arial" charset="0"/>
                 <a:sym typeface="Cabin"/>
               </a:rPr>
               <a:t>fhand</a:t>
             </a:r>
             <a:r>
-              <a:rPr lang="en-US" sz="3600" b="0" i="0" u="none" strike="noStrike" cap="none">
+              <a:rPr lang="en-US" sz="3600" u="none" strike="noStrike" cap="none">
                 <a:solidFill>
                   <a:schemeClr val="lt1"/>
                 </a:solidFill>
-                <a:latin typeface="Cabin"/>
-                <a:ea typeface="Cabin"/>
-                <a:cs typeface="Cabin"/>
+                <a:latin typeface="Arial" charset="0"/>
+                <a:ea typeface="Arial" charset="0"/>
+                <a:cs typeface="Arial" charset="0"/>
                 <a:sym typeface="Cabin"/>
               </a:rPr>
               <a:t> = </a:t>
             </a:r>
             <a:r>
-              <a:rPr lang="en-US" sz="3600" b="0" i="0" u="none" strike="noStrike" cap="none">
+              <a:rPr lang="en-US" sz="3600" u="none" strike="noStrike" cap="none">
                 <a:solidFill>
                   <a:srgbClr val="FF00FF"/>
                 </a:solidFill>
-                <a:latin typeface="Cabin"/>
-                <a:ea typeface="Cabin"/>
-                <a:cs typeface="Cabin"/>
+                <a:latin typeface="Arial" charset="0"/>
+                <a:ea typeface="Arial" charset="0"/>
+                <a:cs typeface="Arial" charset="0"/>
                 <a:sym typeface="Cabin"/>
               </a:rPr>
               <a:t>open</a:t>
             </a:r>
             <a:r>
-              <a:rPr lang="en-US" sz="3600" b="0" i="0" u="none" strike="noStrike" cap="none">
+              <a:rPr lang="en-US" sz="3600" u="none" strike="noStrike" cap="none">
                 <a:solidFill>
                   <a:schemeClr val="lt1"/>
                 </a:solidFill>
-                <a:latin typeface="Cabin"/>
-                <a:ea typeface="Cabin"/>
-                <a:cs typeface="Cabin"/>
+                <a:latin typeface="Arial" charset="0"/>
+                <a:ea typeface="Arial" charset="0"/>
+                <a:cs typeface="Arial" charset="0"/>
                 <a:sym typeface="Cabin"/>
               </a:rPr>
               <a:t>('</a:t>
             </a:r>
             <a:r>
-              <a:rPr lang="en-US" sz="3600" b="0" i="0" u="none" strike="noStrike" cap="none">
+              <a:rPr lang="en-US" sz="3600" u="none" strike="noStrike" cap="none">
                 <a:solidFill>
                   <a:srgbClr val="00FFFF"/>
                 </a:solidFill>
-                <a:latin typeface="Cabin"/>
-                <a:ea typeface="Cabin"/>
-                <a:cs typeface="Cabin"/>
+                <a:latin typeface="Arial" charset="0"/>
+                <a:ea typeface="Arial" charset="0"/>
+                <a:cs typeface="Arial" charset="0"/>
                 <a:sym typeface="Cabin"/>
               </a:rPr>
               <a:t>mbox.txt</a:t>
             </a:r>
             <a:r>
-              <a:rPr lang="en-US" sz="3600" b="0" i="0" u="none" strike="noStrike" cap="none">
+              <a:rPr lang="en-US" sz="3600" u="none" strike="noStrike" cap="none">
                 <a:solidFill>
                   <a:schemeClr val="lt1"/>
                 </a:solidFill>
-                <a:latin typeface="Cabin"/>
-                <a:ea typeface="Cabin"/>
-                <a:cs typeface="Cabin"/>
+                <a:latin typeface="Arial" charset="0"/>
+                <a:ea typeface="Arial" charset="0"/>
+                <a:cs typeface="Arial" charset="0"/>
                 <a:sym typeface="Cabin"/>
               </a:rPr>
               <a:t>', '</a:t>
             </a:r>
             <a:r>
-              <a:rPr lang="en-US" sz="3600" b="0" i="0" u="none" strike="noStrike" cap="none">
+              <a:rPr lang="en-US" sz="3600" u="none" strike="noStrike" cap="none">
                 <a:solidFill>
                   <a:srgbClr val="FFFF00"/>
                 </a:solidFill>
-                <a:latin typeface="Cabin"/>
-                <a:ea typeface="Cabin"/>
-                <a:cs typeface="Cabin"/>
+                <a:latin typeface="Arial" charset="0"/>
+                <a:ea typeface="Arial" charset="0"/>
+                <a:cs typeface="Arial" charset="0"/>
                 <a:sym typeface="Cabin"/>
               </a:rPr>
               <a:t>r</a:t>
             </a:r>
             <a:r>
-              <a:rPr lang="en-US" sz="3600" b="0" i="0" u="none" strike="noStrike" cap="none">
+              <a:rPr lang="en-US" sz="3600" u="none" strike="noStrike" cap="none">
                 <a:solidFill>
                   <a:schemeClr val="lt1"/>
                 </a:solidFill>
-                <a:latin typeface="Cabin"/>
-                <a:ea typeface="Cabin"/>
-                <a:cs typeface="Cabin"/>
+                <a:latin typeface="Arial" charset="0"/>
+                <a:ea typeface="Arial" charset="0"/>
+                <a:cs typeface="Arial" charset="0"/>
                 <a:sym typeface="Cabin"/>
               </a:rPr>
               <a:t>')</a:t>
@@ -33556,13 +33556,13 @@
               <a:buNone/>
             </a:pPr>
             <a:r>
-              <a:rPr lang="en-US" sz="7600" b="0" i="0" u="none" strike="noStrike" cap="none">
+              <a:rPr lang="en-US" sz="7600" u="none" strike="noStrike" cap="none">
                 <a:solidFill>
                   <a:srgbClr val="FFFF00"/>
                 </a:solidFill>
-                <a:latin typeface="Cabin"/>
-                <a:ea typeface="Cabin"/>
-                <a:cs typeface="Cabin"/>
+                <a:latin typeface="Arial" charset="0"/>
+                <a:ea typeface="Arial" charset="0"/>
+                <a:cs typeface="Arial" charset="0"/>
                 <a:sym typeface="Cabin"/>
               </a:rPr>
               <a:t>What is a Handle?</a:t>
@@ -33896,13 +33896,13 @@
               <a:buNone/>
             </a:pPr>
             <a:r>
-              <a:rPr lang="en-US" sz="7600" b="0" i="0" u="none" strike="noStrike" cap="none">
+              <a:rPr lang="en-US" sz="7600" u="none" strike="noStrike" cap="none">
                 <a:solidFill>
                   <a:srgbClr val="FFFF00"/>
                 </a:solidFill>
-                <a:latin typeface="Cabin"/>
-                <a:ea typeface="Cabin"/>
-                <a:cs typeface="Cabin"/>
+                <a:latin typeface="Arial" charset="0"/>
+                <a:ea typeface="Arial" charset="0"/>
+                <a:cs typeface="Arial" charset="0"/>
                 <a:sym typeface="Cabin"/>
               </a:rPr>
               <a:t>When Files are Missing</a:t>
@@ -34178,13 +34178,13 @@
               <a:buNone/>
             </a:pPr>
             <a:r>
-              <a:rPr lang="en-US" sz="7600" b="0" i="0" u="none" strike="noStrike" cap="none">
+              <a:rPr lang="en-US" sz="7600" u="none" strike="noStrike" cap="none">
                 <a:solidFill>
                   <a:srgbClr val="FFFF00"/>
                 </a:solidFill>
-                <a:latin typeface="Cabin"/>
-                <a:ea typeface="Cabin"/>
-                <a:cs typeface="Cabin"/>
+                <a:latin typeface="Arial" charset="0"/>
+                <a:ea typeface="Arial" charset="0"/>
+                <a:cs typeface="Arial" charset="0"/>
                 <a:sym typeface="Cabin"/>
               </a:rPr>
               <a:t>The newline</a:t>
@@ -34194,21 +34194,21 @@
                 <a:solidFill>
                   <a:srgbClr val="FFFF00"/>
                 </a:solidFill>
-                <a:latin typeface="Cabin"/>
-                <a:ea typeface="Cabin"/>
-                <a:cs typeface="Cabin"/>
+                <a:latin typeface="Arial" charset="0"/>
+                <a:ea typeface="Arial" charset="0"/>
+                <a:cs typeface="Arial" charset="0"/>
                 <a:sym typeface="Cabin"/>
               </a:rPr>
               <a:t> </a:t>
             </a:r>
             <a:r>
-              <a:rPr lang="en-US" sz="7600" b="0" i="0" u="none" strike="noStrike" cap="none">
+              <a:rPr lang="en-US" sz="7600" u="none" strike="noStrike" cap="none">
                 <a:solidFill>
                   <a:srgbClr val="FFFF00"/>
                 </a:solidFill>
-                <a:latin typeface="Cabin"/>
-                <a:ea typeface="Cabin"/>
-                <a:cs typeface="Cabin"/>
+                <a:latin typeface="Arial" charset="0"/>
+                <a:ea typeface="Arial" charset="0"/>
+                <a:cs typeface="Arial" charset="0"/>
                 <a:sym typeface="Cabin"/>
               </a:rPr>
               <a:t>Character</a:t>
@@ -34263,13 +34263,13 @@
               <a:buChar char="•"/>
             </a:pPr>
             <a:r>
-              <a:rPr lang="en-US" sz="3600" b="0" i="0" u="none" strike="noStrike" cap="none">
+              <a:rPr lang="en-US" sz="3600" u="none" strike="noStrike" cap="none">
                 <a:solidFill>
                   <a:schemeClr val="lt1"/>
                 </a:solidFill>
-                <a:latin typeface="Cabin"/>
-                <a:ea typeface="Cabin"/>
-                <a:cs typeface="Cabin"/>
+                <a:latin typeface="Arial" charset="0"/>
+                <a:ea typeface="Arial" charset="0"/>
+                <a:cs typeface="Arial" charset="0"/>
                 <a:sym typeface="Cabin"/>
               </a:rPr>
               <a:t>We use a special character </a:t>
@@ -34279,9 +34279,9 @@
                 <a:solidFill>
                   <a:schemeClr val="lt1"/>
                 </a:solidFill>
-                <a:latin typeface="Cabin"/>
-                <a:ea typeface="Cabin"/>
-                <a:cs typeface="Cabin"/>
+                <a:latin typeface="Arial" charset="0"/>
+                <a:ea typeface="Arial" charset="0"/>
+                <a:cs typeface="Arial" charset="0"/>
                 <a:sym typeface="Cabin"/>
               </a:rPr>
               <a:t>called the “</a:t>
@@ -34291,9 +34291,9 @@
                 <a:solidFill>
                   <a:srgbClr val="00FFFF"/>
                 </a:solidFill>
-                <a:latin typeface="Cabin"/>
-                <a:ea typeface="Cabin"/>
-                <a:cs typeface="Cabin"/>
+                <a:latin typeface="Arial" charset="0"/>
+                <a:ea typeface="Arial" charset="0"/>
+                <a:cs typeface="Arial" charset="0"/>
                 <a:sym typeface="Cabin"/>
               </a:rPr>
               <a:t>newline</a:t>
@@ -34303,21 +34303,21 @@
                 <a:solidFill>
                   <a:schemeClr val="lt1"/>
                 </a:solidFill>
-                <a:latin typeface="Cabin"/>
-                <a:ea typeface="Cabin"/>
-                <a:cs typeface="Cabin"/>
+                <a:latin typeface="Arial" charset="0"/>
+                <a:ea typeface="Arial" charset="0"/>
+                <a:cs typeface="Arial" charset="0"/>
                 <a:sym typeface="Cabin"/>
               </a:rPr>
               <a:t>” </a:t>
             </a:r>
             <a:r>
-              <a:rPr lang="en-US" sz="3600" b="0" i="0" u="none" strike="noStrike" cap="none">
+              <a:rPr lang="en-US" sz="3600" u="none" strike="noStrike" cap="none">
                 <a:solidFill>
                   <a:schemeClr val="lt1"/>
                 </a:solidFill>
-                <a:latin typeface="Cabin"/>
-                <a:ea typeface="Cabin"/>
-                <a:cs typeface="Cabin"/>
+                <a:latin typeface="Arial" charset="0"/>
+                <a:ea typeface="Arial" charset="0"/>
+                <a:cs typeface="Arial" charset="0"/>
                 <a:sym typeface="Cabin"/>
               </a:rPr>
               <a:t>to indicate when a line ends </a:t>
@@ -34342,37 +34342,37 @@
               <a:buChar char="•"/>
             </a:pPr>
             <a:r>
-              <a:rPr lang="en-US" sz="3600" b="0" i="0" u="none" strike="noStrike" cap="none">
+              <a:rPr lang="en-US" sz="3600" u="none" strike="noStrike" cap="none">
                 <a:solidFill>
                   <a:schemeClr val="lt1"/>
                 </a:solidFill>
-                <a:latin typeface="Cabin"/>
-                <a:ea typeface="Cabin"/>
-                <a:cs typeface="Cabin"/>
+                <a:latin typeface="Arial" charset="0"/>
+                <a:ea typeface="Arial" charset="0"/>
+                <a:cs typeface="Arial" charset="0"/>
                 <a:sym typeface="Cabin"/>
               </a:rPr>
               <a:t>We represent it as </a:t>
             </a:r>
             <a:r>
-              <a:rPr lang="en-US" sz="3600" b="0" i="0" u="none" strike="noStrike" cap="none">
+              <a:rPr lang="en-US" sz="3600" u="none" strike="noStrike" cap="none">
                 <a:solidFill>
                   <a:srgbClr val="00FFFF"/>
                 </a:solidFill>
-                <a:latin typeface="Cabin"/>
-                <a:ea typeface="Cabin"/>
-                <a:cs typeface="Cabin"/>
+                <a:latin typeface="Arial" charset="0"/>
+                <a:ea typeface="Arial" charset="0"/>
+                <a:cs typeface="Arial" charset="0"/>
                 <a:sym typeface="Cabin"/>
               </a:rPr>
               <a:t>\n</a:t>
             </a:r>
             <a:r>
-              <a:rPr lang="en-US" sz="3600" b="0" i="0" u="none" strike="noStrike" cap="none">
+              <a:rPr lang="en-US" sz="3600" u="none" strike="noStrike" cap="none">
                 <a:solidFill>
                   <a:schemeClr val="lt1"/>
                 </a:solidFill>
-                <a:latin typeface="Cabin"/>
-                <a:ea typeface="Cabin"/>
-                <a:cs typeface="Cabin"/>
+                <a:latin typeface="Arial" charset="0"/>
+                <a:ea typeface="Arial" charset="0"/>
+                <a:cs typeface="Arial" charset="0"/>
                 <a:sym typeface="Cabin"/>
               </a:rPr>
               <a:t> in strings </a:t>
@@ -34397,25 +34397,25 @@
               <a:buChar char="•"/>
             </a:pPr>
             <a:r>
-              <a:rPr lang="en-US" sz="3600" b="0" i="0" u="none" strike="noStrike" cap="none">
+              <a:rPr lang="en-US" sz="3600" u="none" strike="noStrike" cap="none">
                 <a:solidFill>
                   <a:srgbClr val="00FFFF"/>
                 </a:solidFill>
-                <a:latin typeface="Cabin"/>
-                <a:ea typeface="Cabin"/>
-                <a:cs typeface="Cabin"/>
+                <a:latin typeface="Arial" charset="0"/>
+                <a:ea typeface="Arial" charset="0"/>
+                <a:cs typeface="Arial" charset="0"/>
                 <a:sym typeface="Cabin"/>
               </a:rPr>
               <a:t>Newline</a:t>
             </a:r>
             <a:r>
-              <a:rPr lang="en-US" sz="3600" b="0" i="0" u="none" strike="noStrike" cap="none">
+              <a:rPr lang="en-US" sz="3600" u="none" strike="noStrike" cap="none">
                 <a:solidFill>
                   <a:schemeClr val="lt1"/>
                 </a:solidFill>
-                <a:latin typeface="Cabin"/>
-                <a:ea typeface="Cabin"/>
-                <a:cs typeface="Cabin"/>
+                <a:latin typeface="Arial" charset="0"/>
+                <a:ea typeface="Arial" charset="0"/>
+                <a:cs typeface="Arial" charset="0"/>
                 <a:sym typeface="Cabin"/>
               </a:rPr>
               <a:t> is still one character - not two</a:t>
@@ -35181,13 +35181,13 @@
               <a:buNone/>
             </a:pPr>
             <a:r>
-              <a:rPr lang="en-US" sz="7600" b="0" i="0" u="none" strike="noStrike" cap="none">
+              <a:rPr lang="en-US" sz="7600" u="none" strike="noStrike" cap="none">
                 <a:solidFill>
                   <a:srgbClr val="FFFF00"/>
                 </a:solidFill>
-                <a:latin typeface="Cabin"/>
-                <a:ea typeface="Cabin"/>
-                <a:cs typeface="Cabin"/>
+                <a:latin typeface="Arial" charset="0"/>
+                <a:ea typeface="Arial" charset="0"/>
+                <a:cs typeface="Arial" charset="0"/>
                 <a:sym typeface="Cabin"/>
               </a:rPr>
               <a:t>File Processing</a:t>
@@ -35242,13 +35242,13 @@
               <a:buChar char="•"/>
             </a:pPr>
             <a:r>
-              <a:rPr lang="en-US" sz="3600" b="0" i="0" u="none" strike="noStrike" cap="none">
+              <a:rPr lang="en-US" sz="3600" u="none" strike="noStrike" cap="none">
                 <a:solidFill>
                   <a:schemeClr val="lt1"/>
                 </a:solidFill>
-                <a:latin typeface="Cabin"/>
-                <a:ea typeface="Cabin"/>
-                <a:cs typeface="Cabin"/>
+                <a:latin typeface="Arial" charset="0"/>
+                <a:ea typeface="Arial" charset="0"/>
+                <a:cs typeface="Arial" charset="0"/>
                 <a:sym typeface="Cabin"/>
               </a:rPr>
               <a:t>A text file can be thought of as a sequence of lines</a:t>

</xml_diff>